<commit_message>
add complete project presentation draft
</commit_message>
<xml_diff>
--- a/project_presentation.pptx
+++ b/project_presentation.pptx
@@ -7,12 +7,13 @@
   <p:sldIdLst>
     <p:sldId id="256" r:id="rId2"/>
     <p:sldId id="257" r:id="rId3"/>
-    <p:sldId id="258" r:id="rId4"/>
-    <p:sldId id="261" r:id="rId5"/>
-    <p:sldId id="259" r:id="rId6"/>
-    <p:sldId id="260" r:id="rId7"/>
-    <p:sldId id="262" r:id="rId8"/>
-    <p:sldId id="263" r:id="rId9"/>
+    <p:sldId id="264" r:id="rId4"/>
+    <p:sldId id="258" r:id="rId5"/>
+    <p:sldId id="261" r:id="rId6"/>
+    <p:sldId id="259" r:id="rId7"/>
+    <p:sldId id="260" r:id="rId8"/>
+    <p:sldId id="262" r:id="rId9"/>
+    <p:sldId id="263" r:id="rId10"/>
   </p:sldIdLst>
   <p:sldSz cx="12192000" cy="6858000"/>
   <p:notesSz cx="6858000" cy="9144000"/>
@@ -111,6 +112,11 @@
       </a:defRPr>
     </a:lvl9pPr>
   </p:defaultTextStyle>
+  <p:extLst>
+    <p:ext uri="{EFAFB233-063F-42B5-8137-9DF3F51BA10A}">
+      <p15:sldGuideLst xmlns:p15="http://schemas.microsoft.com/office/powerpoint/2012/main"/>
+    </p:ext>
+  </p:extLst>
 </p:presentation>
 </file>
 
@@ -340,7 +346,7 @@
           <a:p>
             <a:fld id="{4BDF68E2-58F2-4D09-BE8B-E3BD06533059}" type="datetimeFigureOut">
               <a:rPr lang="en-US" dirty="0"/>
-              <a:t>3/10/2015</a:t>
+              <a:t>3/15/2015</a:t>
             </a:fld>
             <a:endParaRPr lang="en-US" dirty="0"/>
           </a:p>
@@ -543,7 +549,7 @@
           <a:p>
             <a:fld id="{2E2D6473-DF6D-4702-B328-E0DD40540A4E}" type="datetimeFigureOut">
               <a:rPr lang="en-US" dirty="0"/>
-              <a:t>3/10/2015</a:t>
+              <a:t>3/15/2015</a:t>
             </a:fld>
             <a:endParaRPr lang="en-US" dirty="0"/>
           </a:p>
@@ -794,7 +800,7 @@
           <a:p>
             <a:fld id="{E26F7E3A-B166-407D-9866-32884E7D5B37}" type="datetimeFigureOut">
               <a:rPr lang="en-US" dirty="0"/>
-              <a:t>3/10/2015</a:t>
+              <a:t>3/15/2015</a:t>
             </a:fld>
             <a:endParaRPr lang="en-US" dirty="0"/>
           </a:p>
@@ -963,7 +969,7 @@
           <a:p>
             <a:fld id="{528FC5F6-F338-4AE4-BB23-26385BCFC423}" type="datetimeFigureOut">
               <a:rPr lang="en-US" dirty="0"/>
-              <a:t>3/10/2015</a:t>
+              <a:t>3/15/2015</a:t>
             </a:fld>
             <a:endParaRPr lang="en-US" dirty="0"/>
           </a:p>
@@ -1301,7 +1307,7 @@
           <a:p>
             <a:fld id="{20EBB0C4-6273-4C6E-B9BD-2EDC30F1CD52}" type="datetimeFigureOut">
               <a:rPr lang="en-US" dirty="0"/>
-              <a:t>3/10/2015</a:t>
+              <a:t>3/15/2015</a:t>
             </a:fld>
             <a:endParaRPr lang="en-US" dirty="0"/>
           </a:p>
@@ -1571,7 +1577,7 @@
           <a:p>
             <a:fld id="{19AB4D41-86C1-4908-B66A-0B50CEB3BF29}" type="datetimeFigureOut">
               <a:rPr lang="en-US" dirty="0"/>
-              <a:t>3/10/2015</a:t>
+              <a:t>3/15/2015</a:t>
             </a:fld>
             <a:endParaRPr lang="en-US" dirty="0"/>
           </a:p>
@@ -1945,7 +1951,7 @@
           <a:p>
             <a:fld id="{E6426E2C-56C1-4E0D-A793-0088A7FDD37E}" type="datetimeFigureOut">
               <a:rPr lang="en-US" dirty="0"/>
-              <a:t>3/10/2015</a:t>
+              <a:t>3/15/2015</a:t>
             </a:fld>
             <a:endParaRPr lang="en-US" dirty="0"/>
           </a:p>
@@ -2058,7 +2064,7 @@
           <a:p>
             <a:fld id="{C8C39B41-D8B5-4052-B551-9B5525EAA8B6}" type="datetimeFigureOut">
               <a:rPr lang="en-US" dirty="0"/>
-              <a:t>3/10/2015</a:t>
+              <a:t>3/15/2015</a:t>
             </a:fld>
             <a:endParaRPr lang="en-US" dirty="0"/>
           </a:p>
@@ -2224,7 +2230,7 @@
           <a:p>
             <a:fld id="{4D94136C-8742-45B2-AF27-D93DF72833A9}" type="datetimeFigureOut">
               <a:rPr lang="en-US" dirty="0"/>
-              <a:t>3/10/2015</a:t>
+              <a:t>3/15/2015</a:t>
             </a:fld>
             <a:endParaRPr lang="en-US" dirty="0"/>
           </a:p>
@@ -2574,7 +2580,7 @@
           <a:p>
             <a:fld id="{32ABBEA6-7C60-4B02-AE87-00D78D8422AF}" type="datetimeFigureOut">
               <a:rPr lang="en-US" dirty="0"/>
-              <a:t>3/10/2015</a:t>
+              <a:t>3/15/2015</a:t>
             </a:fld>
             <a:endParaRPr lang="en-US" dirty="0"/>
           </a:p>
@@ -2952,7 +2958,7 @@
           <a:p>
             <a:fld id="{C9CAD897-D46E-4AD2-BD9B-49DD3E640873}" type="datetimeFigureOut">
               <a:rPr lang="en-US" dirty="0"/>
-              <a:t>3/10/2015</a:t>
+              <a:t>3/15/2015</a:t>
             </a:fld>
             <a:endParaRPr lang="en-US" dirty="0"/>
           </a:p>
@@ -3234,7 +3240,7 @@
           <a:p>
             <a:fld id="{98624D31-43A5-475A-80CF-332C9F6DCF35}" type="datetimeFigureOut">
               <a:rPr lang="en-US" dirty="0"/>
-              <a:t>3/10/2015</a:t>
+              <a:t>3/15/2015</a:t>
             </a:fld>
             <a:endParaRPr lang="en-US" dirty="0"/>
           </a:p>
@@ -3883,20 +3889,163 @@
           <a:lstStyle/>
           <a:p>
             <a:r>
-              <a:rPr lang="en-US" dirty="0" smtClean="0"/>
-              <a:t>Something in here about wanting to see if features created from visual data, the way a human trader would interpret them, could be more reasonably learned from by a machine.</a:t>
-            </a:r>
-          </a:p>
-          <a:p>
-            <a:endParaRPr lang="en-US" dirty="0"/>
-          </a:p>
-          <a:p>
-            <a:r>
-              <a:rPr lang="en-US" dirty="0" smtClean="0"/>
-              <a:t>Something else about how “technical analysis” when performed by humans is basically bunk, but hypothesis is that that’s primarily due to looking for “too obvious” patterns – ML may be able to pick up on significant things that we can’t see, etc.</a:t>
-            </a:r>
-          </a:p>
-          <a:p>
+              <a:rPr lang="en-US" b="1" dirty="0" smtClean="0"/>
+              <a:t>Can visual features be used for predictive modeling? </a:t>
+            </a:r>
+            <a:endParaRPr lang="en-US" b="1" dirty="0"/>
+          </a:p>
+          <a:p>
+            <a:r>
+              <a:rPr lang="en-US" dirty="0" smtClean="0"/>
+              <a:t>“Technical analysis” attempts to do so, with humans as the “model”… but is basically bunk</a:t>
+            </a:r>
+          </a:p>
+          <a:p>
+            <a:r>
+              <a:rPr lang="en-US" dirty="0" smtClean="0"/>
+              <a:t>Machine learning may be able to improve upon fallible human traits and perceptual biases</a:t>
+            </a:r>
+          </a:p>
+        </p:txBody>
+      </p:sp>
+      <p:pic>
+        <p:nvPicPr>
+          <p:cNvPr id="1026" name="Picture 2" descr="http://www.cmsfx.com/resources/graphix/0001/technical-analysis-fig43.gif"/>
+          <p:cNvPicPr>
+            <a:picLocks noChangeAspect="1" noChangeArrowheads="1"/>
+          </p:cNvPicPr>
+          <p:nvPr/>
+        </p:nvPicPr>
+        <p:blipFill>
+          <a:blip r:embed="rId2">
+            <a:extLst>
+              <a:ext uri="{28A0092B-C50C-407E-A947-70E740481C1C}">
+                <a14:useLocalDpi xmlns:a14="http://schemas.microsoft.com/office/drawing/2010/main" val="0"/>
+              </a:ext>
+            </a:extLst>
+          </a:blip>
+          <a:srcRect/>
+          <a:stretch>
+            <a:fillRect/>
+          </a:stretch>
+        </p:blipFill>
+        <p:spPr bwMode="auto">
+          <a:xfrm>
+            <a:off x="1097280" y="3599719"/>
+            <a:ext cx="3541983" cy="2377749"/>
+          </a:xfrm>
+          <a:prstGeom prst="rect">
+            <a:avLst/>
+          </a:prstGeom>
+          <a:noFill/>
+          <a:extLst>
+            <a:ext uri="{909E8E84-426E-40DD-AFC4-6F175D3DCCD1}">
+              <a14:hiddenFill xmlns:a14="http://schemas.microsoft.com/office/drawing/2010/main">
+                <a:solidFill>
+                  <a:srgbClr val="FFFFFF"/>
+                </a:solidFill>
+              </a14:hiddenFill>
+            </a:ext>
+          </a:extLst>
+        </p:spPr>
+      </p:pic>
+      <p:pic>
+        <p:nvPicPr>
+          <p:cNvPr id="1028" name="Picture 4" descr="http://gromgull.net/blog/wp-content/uploads/2010/03/htm.png"/>
+          <p:cNvPicPr>
+            <a:picLocks noChangeAspect="1" noChangeArrowheads="1"/>
+          </p:cNvPicPr>
+          <p:nvPr/>
+        </p:nvPicPr>
+        <p:blipFill>
+          <a:blip r:embed="rId3">
+            <a:extLst>
+              <a:ext uri="{28A0092B-C50C-407E-A947-70E740481C1C}">
+                <a14:useLocalDpi xmlns:a14="http://schemas.microsoft.com/office/drawing/2010/main" val="0"/>
+              </a:ext>
+            </a:extLst>
+          </a:blip>
+          <a:srcRect/>
+          <a:stretch>
+            <a:fillRect/>
+          </a:stretch>
+        </p:blipFill>
+        <p:spPr bwMode="auto">
+          <a:xfrm>
+            <a:off x="6961621" y="3170824"/>
+            <a:ext cx="2764270" cy="2698270"/>
+          </a:xfrm>
+          <a:prstGeom prst="rect">
+            <a:avLst/>
+          </a:prstGeom>
+          <a:noFill/>
+          <a:extLst>
+            <a:ext uri="{909E8E84-426E-40DD-AFC4-6F175D3DCCD1}">
+              <a14:hiddenFill xmlns:a14="http://schemas.microsoft.com/office/drawing/2010/main">
+                <a:solidFill>
+                  <a:srgbClr val="FFFFFF"/>
+                </a:solidFill>
+              </a14:hiddenFill>
+            </a:ext>
+          </a:extLst>
+        </p:spPr>
+      </p:pic>
+      <p:sp>
+        <p:nvSpPr>
+          <p:cNvPr id="4" name="TextBox 3"/>
+          <p:cNvSpPr txBox="1"/>
+          <p:nvPr/>
+        </p:nvSpPr>
+        <p:spPr>
+          <a:xfrm>
+            <a:off x="4998027" y="4603927"/>
+            <a:ext cx="1579418" cy="369332"/>
+          </a:xfrm>
+          <a:prstGeom prst="rect">
+            <a:avLst/>
+          </a:prstGeom>
+          <a:noFill/>
+        </p:spPr>
+        <p:txBody>
+          <a:bodyPr wrap="square" rtlCol="0">
+            <a:spAutoFit/>
+          </a:bodyPr>
+          <a:lstStyle/>
+          <a:p>
+            <a:r>
+              <a:rPr lang="en-US" dirty="0" smtClean="0"/>
+              <a:t>= baloney</a:t>
+            </a:r>
+            <a:endParaRPr lang="en-US" dirty="0"/>
+          </a:p>
+        </p:txBody>
+      </p:sp>
+      <p:sp>
+        <p:nvSpPr>
+          <p:cNvPr id="7" name="TextBox 6"/>
+          <p:cNvSpPr txBox="1"/>
+          <p:nvPr/>
+        </p:nvSpPr>
+        <p:spPr>
+          <a:xfrm>
+            <a:off x="10110067" y="4603927"/>
+            <a:ext cx="1579418" cy="369332"/>
+          </a:xfrm>
+          <a:prstGeom prst="rect">
+            <a:avLst/>
+          </a:prstGeom>
+          <a:noFill/>
+        </p:spPr>
+        <p:txBody>
+          <a:bodyPr wrap="square" rtlCol="0">
+            <a:spAutoFit/>
+          </a:bodyPr>
+          <a:lstStyle/>
+          <a:p>
+            <a:r>
+              <a:rPr lang="en-US" dirty="0" smtClean="0"/>
+              <a:t>= better (?)</a:t>
+            </a:r>
             <a:endParaRPr lang="en-US" dirty="0"/>
           </a:p>
         </p:txBody>
@@ -3955,7 +4104,7 @@
           <a:p>
             <a:r>
               <a:rPr lang="en-US" dirty="0" smtClean="0"/>
-              <a:t>The Approach</a:t>
+              <a:t>The Data</a:t>
             </a:r>
             <a:endParaRPr lang="en-US" dirty="0"/>
           </a:p>
@@ -3971,60 +4120,92 @@
             <p:ph idx="1"/>
           </p:nvPr>
         </p:nvSpPr>
-        <p:spPr/>
-        <p:txBody>
-          <a:bodyPr/>
+        <p:spPr>
+          <a:xfrm>
+            <a:off x="1097280" y="1845734"/>
+            <a:ext cx="4981402" cy="4023360"/>
+          </a:xfrm>
+        </p:spPr>
+        <p:txBody>
+          <a:bodyPr>
+            <a:normAutofit lnSpcReduction="10000"/>
+          </a:bodyPr>
           <a:lstStyle/>
           <a:p>
             <a:r>
               <a:rPr lang="en-US" dirty="0" smtClean="0"/>
-              <a:t>Find appropriate TS data (minute level)</a:t>
-            </a:r>
-          </a:p>
-          <a:p>
-            <a:r>
-              <a:rPr lang="en-US" dirty="0" smtClean="0"/>
-              <a:t>Slice into some window (arbitrary; would like to try more but lacking processing power – some comment here about plan B trying 5 vs. 10 and having some “interpretable” impact on results)</a:t>
-            </a:r>
-          </a:p>
-          <a:p>
-            <a:r>
-              <a:rPr lang="en-US" dirty="0" smtClean="0"/>
-              <a:t>Graph data for each window</a:t>
-            </a:r>
-          </a:p>
-          <a:p>
-            <a:r>
-              <a:rPr lang="en-US" dirty="0" smtClean="0"/>
-              <a:t>Use CV to convert the graph to pixel intensity data</a:t>
-            </a:r>
-          </a:p>
-          <a:p>
-            <a:r>
-              <a:rPr lang="en-US" dirty="0" smtClean="0"/>
-              <a:t>Unroll the pixel data vector into a set of 100s to 1000s of new features for each observation, “generated” from the underlying 4-5 points</a:t>
-            </a:r>
-            <a:endParaRPr lang="en-US" dirty="0"/>
-          </a:p>
-        </p:txBody>
-      </p:sp>
+              <a:t>Time series data were obtained from a Google Finance API that allows pulls of price data for a given ticker at the one-minute tick level (up to 20 days historical)</a:t>
+            </a:r>
+          </a:p>
+          <a:p>
+            <a:r>
+              <a:rPr lang="en-US" dirty="0" smtClean="0"/>
+              <a:t>Data are provided for open, high, low, and close (OHLC) prices for each interval</a:t>
+            </a:r>
+          </a:p>
+          <a:p>
+            <a:r>
+              <a:rPr lang="en-US" dirty="0" smtClean="0"/>
+              <a:t>Data are clean, but inconveniently </a:t>
+            </a:r>
+            <a:r>
+              <a:rPr lang="en-US" dirty="0" err="1" smtClean="0"/>
+              <a:t>timestamped</a:t>
+            </a:r>
+            <a:r>
+              <a:rPr lang="en-US" dirty="0" smtClean="0"/>
+              <a:t> (in Unix epoch format)…</a:t>
+            </a:r>
+          </a:p>
+          <a:p>
+            <a:r>
+              <a:rPr lang="en-US" dirty="0" smtClean="0"/>
+              <a:t>…fortunately, Python and pandas allow for relatively easy cleanup and indexing of time data</a:t>
+            </a:r>
+          </a:p>
+          <a:p>
+            <a:r>
+              <a:rPr lang="en-US" dirty="0" smtClean="0"/>
+              <a:t>Indexing is important, to keep us honest and not allowing our models to peer into the future</a:t>
+            </a:r>
+            <a:endParaRPr lang="en-US" dirty="0"/>
+          </a:p>
+        </p:txBody>
+      </p:sp>
+      <p:pic>
+        <p:nvPicPr>
+          <p:cNvPr id="4" name="Picture 3"/>
+          <p:cNvPicPr>
+            <a:picLocks noChangeAspect="1"/>
+          </p:cNvPicPr>
+          <p:nvPr/>
+        </p:nvPicPr>
+        <p:blipFill>
+          <a:blip r:embed="rId2"/>
+          <a:stretch>
+            <a:fillRect/>
+          </a:stretch>
+        </p:blipFill>
+        <p:spPr>
+          <a:xfrm>
+            <a:off x="7088505" y="1868594"/>
+            <a:ext cx="4067175" cy="4000500"/>
+          </a:xfrm>
+          <a:prstGeom prst="rect">
+            <a:avLst/>
+          </a:prstGeom>
+        </p:spPr>
+      </p:pic>
     </p:spTree>
     <p:extLst>
       <p:ext uri="{BB962C8B-B14F-4D97-AF65-F5344CB8AC3E}">
-        <p14:creationId xmlns:p14="http://schemas.microsoft.com/office/powerpoint/2010/main" val="2407033393"/>
+        <p14:creationId xmlns:p14="http://schemas.microsoft.com/office/powerpoint/2010/main" val="1208261519"/>
       </p:ext>
     </p:extLst>
   </p:cSld>
   <p:clrMapOvr>
     <a:masterClrMapping/>
   </p:clrMapOvr>
-  <p:timing>
-    <p:tnLst>
-      <p:par>
-        <p:cTn id="1" dur="indefinite" restart="never" nodeType="tmRoot"/>
-      </p:par>
-    </p:tnLst>
-  </p:timing>
 </p:sld>
 </file>
 
@@ -4062,20 +4243,20 @@
           <a:p>
             <a:r>
               <a:rPr lang="en-US" dirty="0" smtClean="0"/>
-              <a:t>Approach, continued</a:t>
-            </a:r>
-            <a:endParaRPr lang="en-US" dirty="0"/>
-          </a:p>
-        </p:txBody>
-      </p:sp>
-      <p:sp>
-        <p:nvSpPr>
-          <p:cNvPr id="3" name="Text Placeholder 2"/>
-          <p:cNvSpPr>
-            <a:spLocks noGrp="1"/>
-          </p:cNvSpPr>
-          <p:nvPr>
-            <p:ph type="body" idx="1"/>
+              <a:t>The Approach</a:t>
+            </a:r>
+            <a:endParaRPr lang="en-US" dirty="0"/>
+          </a:p>
+        </p:txBody>
+      </p:sp>
+      <p:sp>
+        <p:nvSpPr>
+          <p:cNvPr id="3" name="Content Placeholder 2"/>
+          <p:cNvSpPr>
+            <a:spLocks noGrp="1"/>
+          </p:cNvSpPr>
+          <p:nvPr>
+            <p:ph idx="1"/>
           </p:nvPr>
         </p:nvSpPr>
         <p:spPr/>
@@ -4083,78 +4264,112 @@
           <a:bodyPr/>
           <a:lstStyle/>
           <a:p>
-            <a:r>
-              <a:rPr lang="en-US" dirty="0" smtClean="0"/>
-              <a:t>From this:</a:t>
-            </a:r>
-            <a:endParaRPr lang="en-US" dirty="0"/>
-          </a:p>
-        </p:txBody>
-      </p:sp>
-      <p:sp>
-        <p:nvSpPr>
-          <p:cNvPr id="4" name="Content Placeholder 3"/>
-          <p:cNvSpPr>
-            <a:spLocks noGrp="1"/>
-          </p:cNvSpPr>
-          <p:nvPr>
-            <p:ph sz="half" idx="2"/>
-          </p:nvPr>
-        </p:nvSpPr>
-        <p:spPr/>
-        <p:txBody>
-          <a:bodyPr/>
-          <a:lstStyle/>
-          <a:p>
-            <a:r>
-              <a:rPr lang="en-US" dirty="0" smtClean="0"/>
-              <a:t>A picture of 4 basic features</a:t>
-            </a:r>
-            <a:endParaRPr lang="en-US" dirty="0"/>
-          </a:p>
-        </p:txBody>
-      </p:sp>
-      <p:sp>
-        <p:nvSpPr>
-          <p:cNvPr id="5" name="Text Placeholder 4"/>
-          <p:cNvSpPr>
-            <a:spLocks noGrp="1"/>
-          </p:cNvSpPr>
-          <p:nvPr>
-            <p:ph type="body" sz="quarter" idx="3"/>
-          </p:nvPr>
-        </p:nvSpPr>
-        <p:spPr/>
-        <p:txBody>
-          <a:bodyPr/>
-          <a:lstStyle/>
-          <a:p>
-            <a:r>
-              <a:rPr lang="en-US" dirty="0" smtClean="0"/>
-              <a:t>To this:</a:t>
-            </a:r>
-            <a:endParaRPr lang="en-US" dirty="0"/>
-          </a:p>
-        </p:txBody>
-      </p:sp>
-      <p:sp>
-        <p:nvSpPr>
-          <p:cNvPr id="6" name="Content Placeholder 5"/>
-          <p:cNvSpPr>
-            <a:spLocks noGrp="1"/>
-          </p:cNvSpPr>
-          <p:nvPr>
-            <p:ph sz="quarter" idx="4"/>
-          </p:nvPr>
-        </p:nvSpPr>
-        <p:spPr/>
-        <p:txBody>
-          <a:bodyPr/>
-          <a:lstStyle/>
-          <a:p>
-            <a:r>
-              <a:rPr lang="en-US" dirty="0" smtClean="0"/>
-              <a:t>A matrix of pixel values</a:t>
+            <a:pPr marL="457200" indent="-457200">
+              <a:buFont typeface="+mj-lt"/>
+              <a:buAutoNum type="arabicPeriod"/>
+            </a:pPr>
+            <a:r>
+              <a:rPr lang="en-US" dirty="0" smtClean="0"/>
+              <a:t>Obtain appropriate time series data </a:t>
+            </a:r>
+            <a:r>
+              <a:rPr lang="en-US" dirty="0" smtClean="0"/>
+              <a:t>(minute level)</a:t>
+            </a:r>
+          </a:p>
+          <a:p>
+            <a:pPr marL="457200" indent="-457200">
+              <a:buFont typeface="+mj-lt"/>
+              <a:buAutoNum type="arabicPeriod"/>
+            </a:pPr>
+            <a:r>
+              <a:rPr lang="en-US" dirty="0" smtClean="0"/>
+              <a:t>Slice </a:t>
+            </a:r>
+            <a:r>
+              <a:rPr lang="en-US" dirty="0" smtClean="0"/>
+              <a:t>into </a:t>
+            </a:r>
+            <a:r>
+              <a:rPr lang="en-US" dirty="0" smtClean="0"/>
+              <a:t>windows </a:t>
+            </a:r>
+          </a:p>
+          <a:p>
+            <a:pPr marL="635508" lvl="1" indent="-342900"/>
+            <a:r>
+              <a:rPr lang="en-US" dirty="0" smtClean="0"/>
+              <a:t>Window length is somewhat arbitrary, but impacts predictions, so can be tuned depending on use case (macro vs. HFT, e.g.)</a:t>
+            </a:r>
+            <a:endParaRPr lang="en-US" dirty="0" smtClean="0"/>
+          </a:p>
+          <a:p>
+            <a:pPr marL="457200" indent="-457200">
+              <a:buFont typeface="+mj-lt"/>
+              <a:buAutoNum type="arabicPeriod"/>
+            </a:pPr>
+            <a:r>
+              <a:rPr lang="en-US" dirty="0" smtClean="0"/>
+              <a:t>Graph </a:t>
+            </a:r>
+            <a:r>
+              <a:rPr lang="en-US" dirty="0" smtClean="0"/>
+              <a:t>data for each </a:t>
+            </a:r>
+            <a:r>
+              <a:rPr lang="en-US" dirty="0" smtClean="0"/>
+              <a:t>window and save as images</a:t>
+            </a:r>
+          </a:p>
+          <a:p>
+            <a:pPr marL="457200" indent="-457200">
+              <a:buFont typeface="+mj-lt"/>
+              <a:buAutoNum type="arabicPeriod"/>
+            </a:pPr>
+            <a:r>
+              <a:rPr lang="en-US" dirty="0" smtClean="0"/>
+              <a:t>Use computer vision (CV) to extract features</a:t>
+            </a:r>
+          </a:p>
+          <a:p>
+            <a:pPr marL="749808" lvl="1" indent="-457200"/>
+            <a:r>
+              <a:rPr lang="en-US" dirty="0" smtClean="0"/>
+              <a:t>Directly from images</a:t>
+            </a:r>
+            <a:endParaRPr lang="en-US" dirty="0" smtClean="0"/>
+          </a:p>
+          <a:p>
+            <a:pPr marL="749808" lvl="1" indent="-457200"/>
+            <a:r>
+              <a:rPr lang="en-US" dirty="0" smtClean="0"/>
+              <a:t>Convert </a:t>
+            </a:r>
+            <a:r>
+              <a:rPr lang="en-US" dirty="0" smtClean="0"/>
+              <a:t>the graph to pixel intensity </a:t>
+            </a:r>
+            <a:r>
+              <a:rPr lang="en-US" dirty="0" smtClean="0"/>
+              <a:t>data, then unroll </a:t>
+            </a:r>
+            <a:r>
+              <a:rPr lang="en-US" dirty="0" smtClean="0"/>
+              <a:t>the pixel data vector into a set of 100s to 1000s of new features for each observation, “generated” from the underlying 4-5 </a:t>
+            </a:r>
+            <a:r>
+              <a:rPr lang="en-US" dirty="0" smtClean="0"/>
+              <a:t>points</a:t>
+            </a:r>
+          </a:p>
+          <a:p>
+            <a:pPr marL="457200" indent="-457200">
+              <a:buFont typeface="+mj-lt"/>
+              <a:buAutoNum type="arabicPeriod"/>
+            </a:pPr>
+            <a:r>
+              <a:rPr lang="en-US" dirty="0" smtClean="0"/>
+              <a:t>Train models on extracted features</a:t>
             </a:r>
             <a:endParaRPr lang="en-US" dirty="0"/>
           </a:p>
@@ -4163,7 +4378,7 @@
     </p:spTree>
     <p:extLst>
       <p:ext uri="{BB962C8B-B14F-4D97-AF65-F5344CB8AC3E}">
-        <p14:creationId xmlns:p14="http://schemas.microsoft.com/office/powerpoint/2010/main" val="1073303505"/>
+        <p14:creationId xmlns:p14="http://schemas.microsoft.com/office/powerpoint/2010/main" val="2407033393"/>
       </p:ext>
     </p:extLst>
   </p:cSld>
@@ -4214,20 +4429,20 @@
           <a:p>
             <a:r>
               <a:rPr lang="en-US" dirty="0" smtClean="0"/>
-              <a:t>Challenges</a:t>
-            </a:r>
-            <a:endParaRPr lang="en-US" dirty="0"/>
-          </a:p>
-        </p:txBody>
-      </p:sp>
-      <p:sp>
-        <p:nvSpPr>
-          <p:cNvPr id="3" name="Content Placeholder 2"/>
-          <p:cNvSpPr>
-            <a:spLocks noGrp="1"/>
-          </p:cNvSpPr>
-          <p:nvPr>
-            <p:ph idx="1"/>
+              <a:t>Approach, continued</a:t>
+            </a:r>
+            <a:endParaRPr lang="en-US" dirty="0"/>
+          </a:p>
+        </p:txBody>
+      </p:sp>
+      <p:sp>
+        <p:nvSpPr>
+          <p:cNvPr id="3" name="Text Placeholder 2"/>
+          <p:cNvSpPr>
+            <a:spLocks noGrp="1"/>
+          </p:cNvSpPr>
+          <p:nvPr>
+            <p:ph type="body" idx="1"/>
           </p:nvPr>
         </p:nvSpPr>
         <p:spPr/>
@@ -4237,52 +4452,393 @@
           <a:p>
             <a:r>
               <a:rPr lang="en-US" dirty="0" smtClean="0"/>
-              <a:t>Data </a:t>
-            </a:r>
-            <a:r>
-              <a:rPr lang="en-US" dirty="0" err="1" smtClean="0"/>
-              <a:t>munging</a:t>
-            </a:r>
-            <a:r>
-              <a:rPr lang="en-US" dirty="0" smtClean="0"/>
-              <a:t> / image processing, more than modeling per se</a:t>
-            </a:r>
-          </a:p>
-          <a:p>
-            <a:r>
-              <a:rPr lang="en-US" dirty="0" smtClean="0"/>
-              <a:t>Not being able to use regular TTS / Cross-Validation</a:t>
-            </a:r>
-          </a:p>
-          <a:p>
-            <a:r>
-              <a:rPr lang="en-US" dirty="0" smtClean="0"/>
-              <a:t>Plan B – generating </a:t>
-            </a:r>
-            <a:r>
-              <a:rPr lang="en-US" dirty="0" err="1" smtClean="0"/>
-              <a:t>add’l</a:t>
-            </a:r>
-            <a:r>
-              <a:rPr lang="en-US" dirty="0" smtClean="0"/>
-              <a:t> features from the basic points I started with</a:t>
-            </a:r>
-          </a:p>
-          <a:p>
-            <a:r>
-              <a:rPr lang="en-US" dirty="0" smtClean="0"/>
-              <a:t>Etc.</a:t>
-            </a:r>
-          </a:p>
-          <a:p>
-            <a:endParaRPr lang="en-US" dirty="0"/>
+              <a:t>From this:</a:t>
+            </a:r>
+            <a:endParaRPr lang="en-US" dirty="0"/>
+          </a:p>
+        </p:txBody>
+      </p:sp>
+      <p:sp>
+        <p:nvSpPr>
+          <p:cNvPr id="5" name="Text Placeholder 4"/>
+          <p:cNvSpPr>
+            <a:spLocks noGrp="1"/>
+          </p:cNvSpPr>
+          <p:nvPr>
+            <p:ph type="body" sz="quarter" idx="3"/>
+          </p:nvPr>
+        </p:nvSpPr>
+        <p:spPr/>
+        <p:txBody>
+          <a:bodyPr/>
+          <a:lstStyle/>
+          <a:p>
+            <a:r>
+              <a:rPr lang="en-US" dirty="0" smtClean="0"/>
+              <a:t>To this:</a:t>
+            </a:r>
+            <a:endParaRPr lang="en-US" dirty="0"/>
+          </a:p>
+        </p:txBody>
+      </p:sp>
+      <p:pic>
+        <p:nvPicPr>
+          <p:cNvPr id="14" name="Content Placeholder 13"/>
+          <p:cNvPicPr>
+            <a:picLocks noGrp="1" noChangeAspect="1"/>
+          </p:cNvPicPr>
+          <p:nvPr>
+            <p:ph sz="half" idx="2"/>
+          </p:nvPr>
+        </p:nvPicPr>
+        <p:blipFill>
+          <a:blip r:embed="rId2">
+            <a:extLst>
+              <a:ext uri="{28A0092B-C50C-407E-A947-70E740481C1C}">
+                <a14:useLocalDpi xmlns:a14="http://schemas.microsoft.com/office/drawing/2010/main" val="0"/>
+              </a:ext>
+            </a:extLst>
+          </a:blip>
+          <a:stretch>
+            <a:fillRect/>
+          </a:stretch>
+        </p:blipFill>
+        <p:spPr>
+          <a:xfrm>
+            <a:off x="1269979" y="4345527"/>
+            <a:ext cx="1764888" cy="1323666"/>
+          </a:xfrm>
+          <a:ln>
+            <a:solidFill>
+              <a:schemeClr val="bg1">
+                <a:lumMod val="85000"/>
+              </a:schemeClr>
+            </a:solidFill>
+          </a:ln>
+        </p:spPr>
+      </p:pic>
+      <p:pic>
+        <p:nvPicPr>
+          <p:cNvPr id="15" name="Picture 14"/>
+          <p:cNvPicPr>
+            <a:picLocks noChangeAspect="1"/>
+          </p:cNvPicPr>
+          <p:nvPr/>
+        </p:nvPicPr>
+        <p:blipFill>
+          <a:blip r:embed="rId3">
+            <a:extLst>
+              <a:ext uri="{28A0092B-C50C-407E-A947-70E740481C1C}">
+                <a14:useLocalDpi xmlns:a14="http://schemas.microsoft.com/office/drawing/2010/main" val="0"/>
+              </a:ext>
+            </a:extLst>
+          </a:blip>
+          <a:stretch>
+            <a:fillRect/>
+          </a:stretch>
+        </p:blipFill>
+        <p:spPr>
+          <a:xfrm>
+            <a:off x="3327169" y="4345527"/>
+            <a:ext cx="1764888" cy="1323666"/>
+          </a:xfrm>
+          <a:prstGeom prst="rect">
+            <a:avLst/>
+          </a:prstGeom>
+          <a:ln>
+            <a:solidFill>
+              <a:schemeClr val="bg1">
+                <a:lumMod val="85000"/>
+              </a:schemeClr>
+            </a:solidFill>
+          </a:ln>
+        </p:spPr>
+      </p:pic>
+      <p:pic>
+        <p:nvPicPr>
+          <p:cNvPr id="16" name="Picture 15"/>
+          <p:cNvPicPr>
+            <a:picLocks noChangeAspect="1"/>
+          </p:cNvPicPr>
+          <p:nvPr/>
+        </p:nvPicPr>
+        <p:blipFill>
+          <a:blip r:embed="rId4">
+            <a:extLst>
+              <a:ext uri="{28A0092B-C50C-407E-A947-70E740481C1C}">
+                <a14:useLocalDpi xmlns:a14="http://schemas.microsoft.com/office/drawing/2010/main" val="0"/>
+              </a:ext>
+            </a:extLst>
+          </a:blip>
+          <a:stretch>
+            <a:fillRect/>
+          </a:stretch>
+        </p:blipFill>
+        <p:spPr>
+          <a:xfrm>
+            <a:off x="1269979" y="2718969"/>
+            <a:ext cx="1764888" cy="1323666"/>
+          </a:xfrm>
+          <a:prstGeom prst="rect">
+            <a:avLst/>
+          </a:prstGeom>
+          <a:ln>
+            <a:solidFill>
+              <a:schemeClr val="bg1">
+                <a:lumMod val="85000"/>
+              </a:schemeClr>
+            </a:solidFill>
+          </a:ln>
+        </p:spPr>
+      </p:pic>
+      <p:pic>
+        <p:nvPicPr>
+          <p:cNvPr id="17" name="Picture 16"/>
+          <p:cNvPicPr>
+            <a:picLocks noChangeAspect="1"/>
+          </p:cNvPicPr>
+          <p:nvPr/>
+        </p:nvPicPr>
+        <p:blipFill>
+          <a:blip r:embed="rId5">
+            <a:extLst>
+              <a:ext uri="{28A0092B-C50C-407E-A947-70E740481C1C}">
+                <a14:useLocalDpi xmlns:a14="http://schemas.microsoft.com/office/drawing/2010/main" val="0"/>
+              </a:ext>
+            </a:extLst>
+          </a:blip>
+          <a:stretch>
+            <a:fillRect/>
+          </a:stretch>
+        </p:blipFill>
+        <p:spPr>
+          <a:xfrm>
+            <a:off x="3327169" y="2718969"/>
+            <a:ext cx="1764888" cy="1323666"/>
+          </a:xfrm>
+          <a:prstGeom prst="rect">
+            <a:avLst/>
+          </a:prstGeom>
+          <a:ln>
+            <a:solidFill>
+              <a:schemeClr val="bg1">
+                <a:lumMod val="85000"/>
+              </a:schemeClr>
+            </a:solidFill>
+          </a:ln>
+        </p:spPr>
+      </p:pic>
+      <p:pic>
+        <p:nvPicPr>
+          <p:cNvPr id="2050" name="Picture 2" descr="http://www.aishack.in/static/img/tut/label-binary-matrix1.jpg"/>
+          <p:cNvPicPr>
+            <a:picLocks noChangeAspect="1" noChangeArrowheads="1"/>
+          </p:cNvPicPr>
+          <p:nvPr/>
+        </p:nvPicPr>
+        <p:blipFill>
+          <a:blip r:embed="rId6">
+            <a:extLst>
+              <a:ext uri="{28A0092B-C50C-407E-A947-70E740481C1C}">
+                <a14:useLocalDpi xmlns:a14="http://schemas.microsoft.com/office/drawing/2010/main" val="0"/>
+              </a:ext>
+            </a:extLst>
+          </a:blip>
+          <a:srcRect/>
+          <a:stretch>
+            <a:fillRect/>
+          </a:stretch>
+        </p:blipFill>
+        <p:spPr bwMode="auto">
+          <a:xfrm>
+            <a:off x="6313953" y="2733409"/>
+            <a:ext cx="1764888" cy="1309226"/>
+          </a:xfrm>
+          <a:prstGeom prst="rect">
+            <a:avLst/>
+          </a:prstGeom>
+          <a:noFill/>
+          <a:extLst>
+            <a:ext uri="{909E8E84-426E-40DD-AFC4-6F175D3DCCD1}">
+              <a14:hiddenFill xmlns:a14="http://schemas.microsoft.com/office/drawing/2010/main">
+                <a:solidFill>
+                  <a:srgbClr val="FFFFFF"/>
+                </a:solidFill>
+              </a14:hiddenFill>
+            </a:ext>
+          </a:extLst>
+        </p:spPr>
+      </p:pic>
+      <p:pic>
+        <p:nvPicPr>
+          <p:cNvPr id="19" name="Picture 2" descr="http://www.aishack.in/static/img/tut/label-binary-matrix1.jpg"/>
+          <p:cNvPicPr>
+            <a:picLocks noChangeAspect="1" noChangeArrowheads="1"/>
+          </p:cNvPicPr>
+          <p:nvPr/>
+        </p:nvPicPr>
+        <p:blipFill>
+          <a:blip r:embed="rId6">
+            <a:extLst>
+              <a:ext uri="{28A0092B-C50C-407E-A947-70E740481C1C}">
+                <a14:useLocalDpi xmlns:a14="http://schemas.microsoft.com/office/drawing/2010/main" val="0"/>
+              </a:ext>
+            </a:extLst>
+          </a:blip>
+          <a:srcRect/>
+          <a:stretch>
+            <a:fillRect/>
+          </a:stretch>
+        </p:blipFill>
+        <p:spPr bwMode="auto">
+          <a:xfrm>
+            <a:off x="6313953" y="4359967"/>
+            <a:ext cx="1764888" cy="1309226"/>
+          </a:xfrm>
+          <a:prstGeom prst="rect">
+            <a:avLst/>
+          </a:prstGeom>
+          <a:noFill/>
+          <a:extLst>
+            <a:ext uri="{909E8E84-426E-40DD-AFC4-6F175D3DCCD1}">
+              <a14:hiddenFill xmlns:a14="http://schemas.microsoft.com/office/drawing/2010/main">
+                <a:solidFill>
+                  <a:srgbClr val="FFFFFF"/>
+                </a:solidFill>
+              </a14:hiddenFill>
+            </a:ext>
+          </a:extLst>
+        </p:spPr>
+      </p:pic>
+      <p:pic>
+        <p:nvPicPr>
+          <p:cNvPr id="20" name="Picture 2" descr="http://www.aishack.in/static/img/tut/label-binary-matrix1.jpg"/>
+          <p:cNvPicPr>
+            <a:picLocks noChangeAspect="1" noChangeArrowheads="1"/>
+          </p:cNvPicPr>
+          <p:nvPr/>
+        </p:nvPicPr>
+        <p:blipFill>
+          <a:blip r:embed="rId6">
+            <a:extLst>
+              <a:ext uri="{28A0092B-C50C-407E-A947-70E740481C1C}">
+                <a14:useLocalDpi xmlns:a14="http://schemas.microsoft.com/office/drawing/2010/main" val="0"/>
+              </a:ext>
+            </a:extLst>
+          </a:blip>
+          <a:srcRect/>
+          <a:stretch>
+            <a:fillRect/>
+          </a:stretch>
+        </p:blipFill>
+        <p:spPr bwMode="auto">
+          <a:xfrm>
+            <a:off x="8418293" y="4359967"/>
+            <a:ext cx="1764888" cy="1309226"/>
+          </a:xfrm>
+          <a:prstGeom prst="rect">
+            <a:avLst/>
+          </a:prstGeom>
+          <a:noFill/>
+          <a:extLst>
+            <a:ext uri="{909E8E84-426E-40DD-AFC4-6F175D3DCCD1}">
+              <a14:hiddenFill xmlns:a14="http://schemas.microsoft.com/office/drawing/2010/main">
+                <a:solidFill>
+                  <a:srgbClr val="FFFFFF"/>
+                </a:solidFill>
+              </a14:hiddenFill>
+            </a:ext>
+          </a:extLst>
+        </p:spPr>
+      </p:pic>
+      <p:pic>
+        <p:nvPicPr>
+          <p:cNvPr id="21" name="Picture 2" descr="http://www.aishack.in/static/img/tut/label-binary-matrix1.jpg"/>
+          <p:cNvPicPr>
+            <a:picLocks noChangeAspect="1" noChangeArrowheads="1"/>
+          </p:cNvPicPr>
+          <p:nvPr/>
+        </p:nvPicPr>
+        <p:blipFill>
+          <a:blip r:embed="rId6">
+            <a:extLst>
+              <a:ext uri="{28A0092B-C50C-407E-A947-70E740481C1C}">
+                <a14:useLocalDpi xmlns:a14="http://schemas.microsoft.com/office/drawing/2010/main" val="0"/>
+              </a:ext>
+            </a:extLst>
+          </a:blip>
+          <a:srcRect/>
+          <a:stretch>
+            <a:fillRect/>
+          </a:stretch>
+        </p:blipFill>
+        <p:spPr bwMode="auto">
+          <a:xfrm>
+            <a:off x="8401893" y="2733409"/>
+            <a:ext cx="1764888" cy="1309226"/>
+          </a:xfrm>
+          <a:prstGeom prst="rect">
+            <a:avLst/>
+          </a:prstGeom>
+          <a:noFill/>
+          <a:extLst>
+            <a:ext uri="{909E8E84-426E-40DD-AFC4-6F175D3DCCD1}">
+              <a14:hiddenFill xmlns:a14="http://schemas.microsoft.com/office/drawing/2010/main">
+                <a:solidFill>
+                  <a:srgbClr val="FFFFFF"/>
+                </a:solidFill>
+              </a14:hiddenFill>
+            </a:ext>
+          </a:extLst>
+        </p:spPr>
+      </p:pic>
+      <p:sp>
+        <p:nvSpPr>
+          <p:cNvPr id="18" name="Striped Right Arrow 17"/>
+          <p:cNvSpPr/>
+          <p:nvPr/>
+        </p:nvSpPr>
+        <p:spPr>
+          <a:xfrm>
+            <a:off x="5278582" y="3834817"/>
+            <a:ext cx="908165" cy="588068"/>
+          </a:xfrm>
+          <a:prstGeom prst="stripedRightArrow">
+            <a:avLst/>
+          </a:prstGeom>
+          <a:solidFill>
+            <a:schemeClr val="bg1"/>
+          </a:solidFill>
+        </p:spPr>
+        <p:style>
+          <a:lnRef idx="2">
+            <a:schemeClr val="accent1">
+              <a:shade val="50000"/>
+            </a:schemeClr>
+          </a:lnRef>
+          <a:fillRef idx="1">
+            <a:schemeClr val="accent1"/>
+          </a:fillRef>
+          <a:effectRef idx="0">
+            <a:schemeClr val="accent1"/>
+          </a:effectRef>
+          <a:fontRef idx="minor">
+            <a:schemeClr val="lt1"/>
+          </a:fontRef>
+        </p:style>
+        <p:txBody>
+          <a:bodyPr rtlCol="0" anchor="ctr"/>
+          <a:lstStyle/>
+          <a:p>
+            <a:pPr algn="ctr"/>
+            <a:endParaRPr lang="en-US"/>
           </a:p>
         </p:txBody>
       </p:sp>
     </p:spTree>
     <p:extLst>
       <p:ext uri="{BB962C8B-B14F-4D97-AF65-F5344CB8AC3E}">
-        <p14:creationId xmlns:p14="http://schemas.microsoft.com/office/powerpoint/2010/main" val="270339517"/>
+        <p14:creationId xmlns:p14="http://schemas.microsoft.com/office/powerpoint/2010/main" val="1073303505"/>
       </p:ext>
     </p:extLst>
   </p:cSld>
@@ -4333,7 +4889,7 @@
           <a:p>
             <a:r>
               <a:rPr lang="en-US" dirty="0" smtClean="0"/>
-              <a:t>Results</a:t>
+              <a:t>Challenges</a:t>
             </a:r>
             <a:endParaRPr lang="en-US" dirty="0"/>
           </a:p>
@@ -4349,29 +4905,109 @@
             <p:ph idx="1"/>
           </p:nvPr>
         </p:nvSpPr>
-        <p:spPr/>
+        <p:spPr>
+          <a:xfrm>
+            <a:off x="1097280" y="1845734"/>
+            <a:ext cx="5085311" cy="4023360"/>
+          </a:xfrm>
+        </p:spPr>
         <p:txBody>
           <a:bodyPr/>
           <a:lstStyle/>
           <a:p>
             <a:r>
               <a:rPr lang="en-US" dirty="0" smtClean="0"/>
-              <a:t>Plan B results for various models – maybe some screenshots, or save for the paper and just report some high-level stats</a:t>
-            </a:r>
-          </a:p>
-          <a:p>
-            <a:r>
-              <a:rPr lang="en-US" dirty="0" smtClean="0"/>
-              <a:t>Plan A if I can get it working by the time this is due</a:t>
-            </a:r>
-            <a:endParaRPr lang="en-US" dirty="0"/>
-          </a:p>
-        </p:txBody>
-      </p:sp>
+              <a:t>Wrangling the graphical data while not running out of RAM</a:t>
+            </a:r>
+          </a:p>
+          <a:p>
+            <a:r>
+              <a:rPr lang="en-US" dirty="0" smtClean="0"/>
+              <a:t>Having patience while trying to train models on massive datasets (~ 6,000 x 30,000 matrix)</a:t>
+            </a:r>
+            <a:endParaRPr lang="en-US" dirty="0" smtClean="0"/>
+          </a:p>
+          <a:p>
+            <a:r>
+              <a:rPr lang="en-US" dirty="0" smtClean="0"/>
+              <a:t>Not </a:t>
+            </a:r>
+            <a:r>
+              <a:rPr lang="en-US" dirty="0" smtClean="0"/>
+              <a:t>being able to use regular </a:t>
+            </a:r>
+            <a:r>
+              <a:rPr lang="en-US" dirty="0" smtClean="0"/>
+              <a:t>TTS / </a:t>
+            </a:r>
+            <a:r>
+              <a:rPr lang="en-US" dirty="0" smtClean="0"/>
+              <a:t>Cross-Validation</a:t>
+            </a:r>
+          </a:p>
+          <a:p>
+            <a:r>
+              <a:rPr lang="en-US" dirty="0" smtClean="0"/>
+              <a:t>Not knowing much of anything about CV prior to embarking on this project</a:t>
+            </a:r>
+          </a:p>
+          <a:p>
+            <a:r>
+              <a:rPr lang="en-US" dirty="0" smtClean="0"/>
+              <a:t>Time constraints on learning and applying new modeling techniques</a:t>
+            </a:r>
+            <a:endParaRPr lang="en-US" dirty="0" smtClean="0"/>
+          </a:p>
+          <a:p>
+            <a:endParaRPr lang="en-US" dirty="0"/>
+          </a:p>
+        </p:txBody>
+      </p:sp>
+      <p:pic>
+        <p:nvPicPr>
+          <p:cNvPr id="3076" name="Picture 4" descr="http://steverudolfi.com/wp-content/uploads/2014/03/mac-sick.jpg"/>
+          <p:cNvPicPr>
+            <a:picLocks noChangeAspect="1" noChangeArrowheads="1"/>
+          </p:cNvPicPr>
+          <p:nvPr/>
+        </p:nvPicPr>
+        <p:blipFill>
+          <a:blip r:embed="rId2">
+            <a:extLst>
+              <a:ext uri="{28A0092B-C50C-407E-A947-70E740481C1C}">
+                <a14:useLocalDpi xmlns:a14="http://schemas.microsoft.com/office/drawing/2010/main" val="0"/>
+              </a:ext>
+            </a:extLst>
+          </a:blip>
+          <a:srcRect/>
+          <a:stretch>
+            <a:fillRect/>
+          </a:stretch>
+        </p:blipFill>
+        <p:spPr bwMode="auto">
+          <a:xfrm>
+            <a:off x="7470775" y="2142913"/>
+            <a:ext cx="3429000" cy="3429001"/>
+          </a:xfrm>
+          <a:prstGeom prst="rect">
+            <a:avLst/>
+          </a:prstGeom>
+          <a:noFill/>
+          <a:extLst>
+            <a:ext uri="{909E8E84-426E-40DD-AFC4-6F175D3DCCD1}">
+              <a14:hiddenFill xmlns:a14="http://schemas.microsoft.com/office/drawing/2010/main">
+                <a:solidFill>
+                  <a:srgbClr val="FFFFFF"/>
+                </a:solidFill>
+              </a14:hiddenFill>
+            </a:ext>
+          </a:extLst>
+        </p:spPr>
+      </p:pic>
     </p:spTree>
     <p:extLst>
       <p:ext uri="{BB962C8B-B14F-4D97-AF65-F5344CB8AC3E}">
-        <p14:creationId xmlns:p14="http://schemas.microsoft.com/office/powerpoint/2010/main" val="870337199"/>
+        <p14:creationId xmlns:p14="http://schemas.microsoft.com/office/powerpoint/2010/main" val="270339517"/>
       </p:ext>
     </p:extLst>
   </p:cSld>
@@ -4422,7 +5058,7 @@
           <a:p>
             <a:r>
               <a:rPr lang="en-US" dirty="0" smtClean="0"/>
-              <a:t>Next Steps</a:t>
+              <a:t>Results</a:t>
             </a:r>
             <a:endParaRPr lang="en-US" dirty="0"/>
           </a:p>
@@ -4436,6 +5072,986 @@
           </p:cNvSpPr>
           <p:nvPr>
             <p:ph idx="1"/>
+          </p:nvPr>
+        </p:nvSpPr>
+        <p:spPr>
+          <a:xfrm>
+            <a:off x="1097280" y="1845734"/>
+            <a:ext cx="3277293" cy="4023360"/>
+          </a:xfrm>
+        </p:spPr>
+        <p:txBody>
+          <a:bodyPr>
+            <a:normAutofit/>
+          </a:bodyPr>
+          <a:lstStyle/>
+          <a:p>
+            <a:r>
+              <a:rPr lang="en-US" dirty="0" smtClean="0"/>
+              <a:t>Modeling was carried out on basic OHLC price data + 5 created features as a baseline</a:t>
+            </a:r>
+          </a:p>
+          <a:p>
+            <a:r>
+              <a:rPr lang="en-US" dirty="0" smtClean="0"/>
+              <a:t>Models varied in performance over these data, but high end performance was impressive</a:t>
+            </a:r>
+            <a:endParaRPr lang="en-US" dirty="0" smtClean="0"/>
+          </a:p>
+          <a:p>
+            <a:r>
+              <a:rPr lang="en-US" dirty="0" smtClean="0"/>
+              <a:t>CV-based extracted features also performed fairly well (for one target case only)</a:t>
+            </a:r>
+          </a:p>
+          <a:p>
+            <a:r>
+              <a:rPr lang="en-US" dirty="0" smtClean="0"/>
+              <a:t>Raw pixel data did not perform well with standard modeling; ANN may be better</a:t>
+            </a:r>
+            <a:endParaRPr lang="en-US" dirty="0"/>
+          </a:p>
+        </p:txBody>
+      </p:sp>
+      <p:graphicFrame>
+        <p:nvGraphicFramePr>
+          <p:cNvPr id="4" name="Table 3"/>
+          <p:cNvGraphicFramePr>
+            <a:graphicFrameLocks noGrp="1"/>
+          </p:cNvGraphicFramePr>
+          <p:nvPr>
+            <p:extLst>
+              <p:ext uri="{D42A27DB-BD31-4B8C-83A1-F6EECF244321}">
+                <p14:modId xmlns:p14="http://schemas.microsoft.com/office/powerpoint/2010/main" val="3750969376"/>
+              </p:ext>
+            </p:extLst>
+          </p:nvPr>
+        </p:nvGraphicFramePr>
+        <p:xfrm>
+          <a:off x="4707081" y="1858544"/>
+          <a:ext cx="6448599" cy="4010550"/>
+        </p:xfrm>
+        <a:graphic>
+          <a:graphicData uri="http://schemas.openxmlformats.org/drawingml/2006/table">
+            <a:tbl>
+              <a:tblPr firstRow="1" bandRow="1">
+                <a:tableStyleId>{5C22544A-7EE6-4342-B048-85BDC9FD1C3A}</a:tableStyleId>
+              </a:tblPr>
+              <a:tblGrid>
+                <a:gridCol w="2452255"/>
+                <a:gridCol w="1163782"/>
+                <a:gridCol w="1007918"/>
+                <a:gridCol w="924791"/>
+                <a:gridCol w="899853"/>
+              </a:tblGrid>
+              <a:tr h="401055">
+                <a:tc>
+                  <a:txBody>
+                    <a:bodyPr/>
+                    <a:lstStyle/>
+                    <a:p>
+                      <a:r>
+                        <a:rPr lang="en-US" dirty="0" smtClean="0"/>
+                        <a:t>Model</a:t>
+                      </a:r>
+                      <a:endParaRPr lang="en-US" dirty="0"/>
+                    </a:p>
+                  </a:txBody>
+                  <a:tcPr/>
+                </a:tc>
+                <a:tc>
+                  <a:txBody>
+                    <a:bodyPr/>
+                    <a:lstStyle/>
+                    <a:p>
+                      <a:r>
+                        <a:rPr lang="en-US" dirty="0" smtClean="0"/>
+                        <a:t>Target</a:t>
+                      </a:r>
+                      <a:endParaRPr lang="en-US" dirty="0"/>
+                    </a:p>
+                  </a:txBody>
+                  <a:tcPr/>
+                </a:tc>
+                <a:tc>
+                  <a:txBody>
+                    <a:bodyPr/>
+                    <a:lstStyle/>
+                    <a:p>
+                      <a:r>
+                        <a:rPr lang="en-US" dirty="0" smtClean="0"/>
+                        <a:t>Base</a:t>
+                      </a:r>
+                      <a:endParaRPr lang="en-US" dirty="0"/>
+                    </a:p>
+                  </a:txBody>
+                  <a:tcPr/>
+                </a:tc>
+                <a:tc>
+                  <a:txBody>
+                    <a:bodyPr/>
+                    <a:lstStyle/>
+                    <a:p>
+                      <a:r>
+                        <a:rPr lang="en-US" dirty="0" smtClean="0"/>
+                        <a:t>Score</a:t>
+                      </a:r>
+                      <a:endParaRPr lang="en-US" dirty="0"/>
+                    </a:p>
+                  </a:txBody>
+                  <a:tcPr/>
+                </a:tc>
+                <a:tc>
+                  <a:txBody>
+                    <a:bodyPr/>
+                    <a:lstStyle/>
+                    <a:p>
+                      <a:r>
+                        <a:rPr lang="en-US" dirty="0" smtClean="0"/>
+                        <a:t>Delta</a:t>
+                      </a:r>
+                      <a:endParaRPr lang="en-US" dirty="0"/>
+                    </a:p>
+                  </a:txBody>
+                  <a:tcPr/>
+                </a:tc>
+              </a:tr>
+              <a:tr h="401055">
+                <a:tc>
+                  <a:txBody>
+                    <a:bodyPr/>
+                    <a:lstStyle/>
+                    <a:p>
+                      <a:r>
+                        <a:rPr lang="en-US" dirty="0" err="1" smtClean="0"/>
+                        <a:t>AdaBoost</a:t>
+                      </a:r>
+                      <a:endParaRPr lang="en-US" dirty="0"/>
+                    </a:p>
+                  </a:txBody>
+                  <a:tcPr/>
+                </a:tc>
+                <a:tc>
+                  <a:txBody>
+                    <a:bodyPr/>
+                    <a:lstStyle/>
+                    <a:p>
+                      <a:r>
+                        <a:rPr lang="en-US" dirty="0" smtClean="0"/>
+                        <a:t>1 min</a:t>
+                      </a:r>
+                      <a:endParaRPr lang="en-US" dirty="0"/>
+                    </a:p>
+                  </a:txBody>
+                  <a:tcPr/>
+                </a:tc>
+                <a:tc>
+                  <a:txBody>
+                    <a:bodyPr/>
+                    <a:lstStyle/>
+                    <a:p>
+                      <a:r>
+                        <a:rPr lang="en-US" dirty="0" smtClean="0"/>
+                        <a:t>.49</a:t>
+                      </a:r>
+                      <a:endParaRPr lang="en-US" dirty="0"/>
+                    </a:p>
+                  </a:txBody>
+                  <a:tcPr/>
+                </a:tc>
+                <a:tc>
+                  <a:txBody>
+                    <a:bodyPr/>
+                    <a:lstStyle/>
+                    <a:p>
+                      <a:r>
+                        <a:rPr lang="en-US" dirty="0" smtClean="0"/>
+                        <a:t>.60</a:t>
+                      </a:r>
+                      <a:endParaRPr lang="en-US" dirty="0"/>
+                    </a:p>
+                  </a:txBody>
+                  <a:tcPr/>
+                </a:tc>
+                <a:tc>
+                  <a:txBody>
+                    <a:bodyPr/>
+                    <a:lstStyle/>
+                    <a:p>
+                      <a:r>
+                        <a:rPr lang="en-US" dirty="0" smtClean="0"/>
+                        <a:t>.11</a:t>
+                      </a:r>
+                      <a:endParaRPr lang="en-US" dirty="0"/>
+                    </a:p>
+                  </a:txBody>
+                  <a:tcPr/>
+                </a:tc>
+              </a:tr>
+              <a:tr h="401055">
+                <a:tc>
+                  <a:txBody>
+                    <a:bodyPr/>
+                    <a:lstStyle/>
+                    <a:p>
+                      <a:r>
+                        <a:rPr lang="en-US" dirty="0" smtClean="0"/>
+                        <a:t>Random</a:t>
+                      </a:r>
+                      <a:r>
+                        <a:rPr lang="en-US" baseline="0" dirty="0" smtClean="0"/>
+                        <a:t> Forest</a:t>
+                      </a:r>
+                      <a:endParaRPr lang="en-US" dirty="0"/>
+                    </a:p>
+                  </a:txBody>
+                  <a:tcPr/>
+                </a:tc>
+                <a:tc>
+                  <a:txBody>
+                    <a:bodyPr/>
+                    <a:lstStyle/>
+                    <a:p>
+                      <a:r>
+                        <a:rPr lang="en-US" dirty="0" smtClean="0"/>
+                        <a:t>1 min</a:t>
+                      </a:r>
+                      <a:endParaRPr lang="en-US" dirty="0"/>
+                    </a:p>
+                  </a:txBody>
+                  <a:tcPr/>
+                </a:tc>
+                <a:tc>
+                  <a:txBody>
+                    <a:bodyPr/>
+                    <a:lstStyle/>
+                    <a:p>
+                      <a:r>
+                        <a:rPr lang="en-US" dirty="0" smtClean="0"/>
+                        <a:t>.49</a:t>
+                      </a:r>
+                      <a:endParaRPr lang="en-US" dirty="0"/>
+                    </a:p>
+                  </a:txBody>
+                  <a:tcPr/>
+                </a:tc>
+                <a:tc>
+                  <a:txBody>
+                    <a:bodyPr/>
+                    <a:lstStyle/>
+                    <a:p>
+                      <a:r>
+                        <a:rPr lang="en-US" dirty="0" smtClean="0"/>
+                        <a:t>.72</a:t>
+                      </a:r>
+                      <a:endParaRPr lang="en-US" dirty="0"/>
+                    </a:p>
+                  </a:txBody>
+                  <a:tcPr/>
+                </a:tc>
+                <a:tc>
+                  <a:txBody>
+                    <a:bodyPr/>
+                    <a:lstStyle/>
+                    <a:p>
+                      <a:r>
+                        <a:rPr lang="en-US" dirty="0" smtClean="0"/>
+                        <a:t>.23</a:t>
+                      </a:r>
+                      <a:endParaRPr lang="en-US" dirty="0"/>
+                    </a:p>
+                  </a:txBody>
+                  <a:tcPr/>
+                </a:tc>
+              </a:tr>
+              <a:tr h="401055">
+                <a:tc>
+                  <a:txBody>
+                    <a:bodyPr/>
+                    <a:lstStyle/>
+                    <a:p>
+                      <a:r>
+                        <a:rPr lang="en-US" dirty="0" smtClean="0"/>
+                        <a:t>Random Forest</a:t>
+                      </a:r>
+                      <a:endParaRPr lang="en-US" dirty="0"/>
+                    </a:p>
+                  </a:txBody>
+                  <a:tcPr/>
+                </a:tc>
+                <a:tc>
+                  <a:txBody>
+                    <a:bodyPr/>
+                    <a:lstStyle/>
+                    <a:p>
+                      <a:r>
+                        <a:rPr lang="en-US" dirty="0" smtClean="0"/>
+                        <a:t>5 min</a:t>
+                      </a:r>
+                      <a:endParaRPr lang="en-US" dirty="0"/>
+                    </a:p>
+                  </a:txBody>
+                  <a:tcPr/>
+                </a:tc>
+                <a:tc>
+                  <a:txBody>
+                    <a:bodyPr/>
+                    <a:lstStyle/>
+                    <a:p>
+                      <a:r>
+                        <a:rPr lang="en-US" dirty="0" smtClean="0"/>
+                        <a:t>.50</a:t>
+                      </a:r>
+                      <a:endParaRPr lang="en-US" dirty="0"/>
+                    </a:p>
+                  </a:txBody>
+                  <a:tcPr/>
+                </a:tc>
+                <a:tc>
+                  <a:txBody>
+                    <a:bodyPr/>
+                    <a:lstStyle/>
+                    <a:p>
+                      <a:r>
+                        <a:rPr lang="en-US" dirty="0" smtClean="0"/>
+                        <a:t>.64</a:t>
+                      </a:r>
+                      <a:endParaRPr lang="en-US" dirty="0"/>
+                    </a:p>
+                  </a:txBody>
+                  <a:tcPr/>
+                </a:tc>
+                <a:tc>
+                  <a:txBody>
+                    <a:bodyPr/>
+                    <a:lstStyle/>
+                    <a:p>
+                      <a:r>
+                        <a:rPr lang="en-US" dirty="0" smtClean="0"/>
+                        <a:t>.14</a:t>
+                      </a:r>
+                    </a:p>
+                  </a:txBody>
+                  <a:tcPr/>
+                </a:tc>
+              </a:tr>
+              <a:tr h="401055">
+                <a:tc>
+                  <a:txBody>
+                    <a:bodyPr/>
+                    <a:lstStyle/>
+                    <a:p>
+                      <a:r>
+                        <a:rPr lang="en-US" dirty="0" smtClean="0"/>
+                        <a:t>Support Vector Machine</a:t>
+                      </a:r>
+                      <a:endParaRPr lang="en-US" dirty="0"/>
+                    </a:p>
+                  </a:txBody>
+                  <a:tcPr/>
+                </a:tc>
+                <a:tc>
+                  <a:txBody>
+                    <a:bodyPr/>
+                    <a:lstStyle/>
+                    <a:p>
+                      <a:r>
+                        <a:rPr lang="en-US" dirty="0" smtClean="0"/>
+                        <a:t>1 min</a:t>
+                      </a:r>
+                      <a:endParaRPr lang="en-US" dirty="0"/>
+                    </a:p>
+                  </a:txBody>
+                  <a:tcPr/>
+                </a:tc>
+                <a:tc>
+                  <a:txBody>
+                    <a:bodyPr/>
+                    <a:lstStyle/>
+                    <a:p>
+                      <a:r>
+                        <a:rPr lang="en-US" dirty="0" smtClean="0"/>
+                        <a:t>.49</a:t>
+                      </a:r>
+                      <a:endParaRPr lang="en-US" dirty="0"/>
+                    </a:p>
+                  </a:txBody>
+                  <a:tcPr/>
+                </a:tc>
+                <a:tc>
+                  <a:txBody>
+                    <a:bodyPr/>
+                    <a:lstStyle/>
+                    <a:p>
+                      <a:r>
+                        <a:rPr lang="en-US" dirty="0" smtClean="0"/>
+                        <a:t>.81</a:t>
+                      </a:r>
+                      <a:endParaRPr lang="en-US" dirty="0"/>
+                    </a:p>
+                  </a:txBody>
+                  <a:tcPr/>
+                </a:tc>
+                <a:tc>
+                  <a:txBody>
+                    <a:bodyPr/>
+                    <a:lstStyle/>
+                    <a:p>
+                      <a:r>
+                        <a:rPr lang="en-US" dirty="0" smtClean="0"/>
+                        <a:t>.32</a:t>
+                      </a:r>
+                      <a:endParaRPr lang="en-US" dirty="0"/>
+                    </a:p>
+                  </a:txBody>
+                  <a:tcPr/>
+                </a:tc>
+              </a:tr>
+              <a:tr h="401055">
+                <a:tc>
+                  <a:txBody>
+                    <a:bodyPr/>
+                    <a:lstStyle/>
+                    <a:p>
+                      <a:r>
+                        <a:rPr lang="en-US" dirty="0" smtClean="0"/>
+                        <a:t>Support Vector Machine</a:t>
+                      </a:r>
+                      <a:endParaRPr lang="en-US" dirty="0"/>
+                    </a:p>
+                  </a:txBody>
+                  <a:tcPr/>
+                </a:tc>
+                <a:tc>
+                  <a:txBody>
+                    <a:bodyPr/>
+                    <a:lstStyle/>
+                    <a:p>
+                      <a:r>
+                        <a:rPr lang="en-US" dirty="0" smtClean="0"/>
+                        <a:t>5 min</a:t>
+                      </a:r>
+                      <a:endParaRPr lang="en-US" dirty="0"/>
+                    </a:p>
+                  </a:txBody>
+                  <a:tcPr/>
+                </a:tc>
+                <a:tc>
+                  <a:txBody>
+                    <a:bodyPr/>
+                    <a:lstStyle/>
+                    <a:p>
+                      <a:r>
+                        <a:rPr lang="en-US" dirty="0" smtClean="0"/>
+                        <a:t>.50</a:t>
+                      </a:r>
+                      <a:endParaRPr lang="en-US" dirty="0"/>
+                    </a:p>
+                  </a:txBody>
+                  <a:tcPr/>
+                </a:tc>
+                <a:tc>
+                  <a:txBody>
+                    <a:bodyPr/>
+                    <a:lstStyle/>
+                    <a:p>
+                      <a:r>
+                        <a:rPr lang="en-US" dirty="0" smtClean="0"/>
+                        <a:t>.71</a:t>
+                      </a:r>
+                      <a:endParaRPr lang="en-US" dirty="0"/>
+                    </a:p>
+                  </a:txBody>
+                  <a:tcPr/>
+                </a:tc>
+                <a:tc>
+                  <a:txBody>
+                    <a:bodyPr/>
+                    <a:lstStyle/>
+                    <a:p>
+                      <a:r>
+                        <a:rPr lang="en-US" dirty="0" smtClean="0"/>
+                        <a:t>.21</a:t>
+                      </a:r>
+                      <a:endParaRPr lang="en-US" dirty="0"/>
+                    </a:p>
+                  </a:txBody>
+                  <a:tcPr/>
+                </a:tc>
+              </a:tr>
+              <a:tr h="401055">
+                <a:tc>
+                  <a:txBody>
+                    <a:bodyPr/>
+                    <a:lstStyle/>
+                    <a:p>
+                      <a:r>
+                        <a:rPr lang="en-US" dirty="0" smtClean="0">
+                          <a:solidFill>
+                            <a:srgbClr val="00B050"/>
+                          </a:solidFill>
+                        </a:rPr>
+                        <a:t>Logistic Regression</a:t>
+                      </a:r>
+                      <a:endParaRPr lang="en-US" dirty="0">
+                        <a:solidFill>
+                          <a:srgbClr val="00B050"/>
+                        </a:solidFill>
+                      </a:endParaRPr>
+                    </a:p>
+                  </a:txBody>
+                  <a:tcPr/>
+                </a:tc>
+                <a:tc>
+                  <a:txBody>
+                    <a:bodyPr/>
+                    <a:lstStyle/>
+                    <a:p>
+                      <a:r>
+                        <a:rPr lang="en-US" dirty="0" smtClean="0">
+                          <a:solidFill>
+                            <a:srgbClr val="00B050"/>
+                          </a:solidFill>
+                        </a:rPr>
+                        <a:t>1 min</a:t>
+                      </a:r>
+                      <a:endParaRPr lang="en-US" dirty="0">
+                        <a:solidFill>
+                          <a:srgbClr val="00B050"/>
+                        </a:solidFill>
+                      </a:endParaRPr>
+                    </a:p>
+                  </a:txBody>
+                  <a:tcPr/>
+                </a:tc>
+                <a:tc>
+                  <a:txBody>
+                    <a:bodyPr/>
+                    <a:lstStyle/>
+                    <a:p>
+                      <a:r>
+                        <a:rPr lang="en-US" dirty="0" smtClean="0">
+                          <a:solidFill>
+                            <a:srgbClr val="00B050"/>
+                          </a:solidFill>
+                        </a:rPr>
+                        <a:t>.49</a:t>
+                      </a:r>
+                      <a:endParaRPr lang="en-US" dirty="0">
+                        <a:solidFill>
+                          <a:srgbClr val="00B050"/>
+                        </a:solidFill>
+                      </a:endParaRPr>
+                    </a:p>
+                  </a:txBody>
+                  <a:tcPr/>
+                </a:tc>
+                <a:tc>
+                  <a:txBody>
+                    <a:bodyPr/>
+                    <a:lstStyle/>
+                    <a:p>
+                      <a:r>
+                        <a:rPr lang="en-US" dirty="0" smtClean="0">
+                          <a:solidFill>
+                            <a:srgbClr val="00B050"/>
+                          </a:solidFill>
+                        </a:rPr>
+                        <a:t>.84</a:t>
+                      </a:r>
+                      <a:endParaRPr lang="en-US" dirty="0">
+                        <a:solidFill>
+                          <a:srgbClr val="00B050"/>
+                        </a:solidFill>
+                      </a:endParaRPr>
+                    </a:p>
+                  </a:txBody>
+                  <a:tcPr/>
+                </a:tc>
+                <a:tc>
+                  <a:txBody>
+                    <a:bodyPr/>
+                    <a:lstStyle/>
+                    <a:p>
+                      <a:r>
+                        <a:rPr lang="en-US" dirty="0" smtClean="0">
+                          <a:solidFill>
+                            <a:srgbClr val="00B050"/>
+                          </a:solidFill>
+                        </a:rPr>
+                        <a:t>.35</a:t>
+                      </a:r>
+                      <a:endParaRPr lang="en-US" dirty="0">
+                        <a:solidFill>
+                          <a:srgbClr val="00B050"/>
+                        </a:solidFill>
+                      </a:endParaRPr>
+                    </a:p>
+                  </a:txBody>
+                  <a:tcPr/>
+                </a:tc>
+              </a:tr>
+              <a:tr h="401055">
+                <a:tc>
+                  <a:txBody>
+                    <a:bodyPr/>
+                    <a:lstStyle/>
+                    <a:p>
+                      <a:r>
+                        <a:rPr lang="en-US" dirty="0" smtClean="0"/>
+                        <a:t>Logistic Regression</a:t>
+                      </a:r>
+                      <a:endParaRPr lang="en-US" dirty="0"/>
+                    </a:p>
+                  </a:txBody>
+                  <a:tcPr/>
+                </a:tc>
+                <a:tc>
+                  <a:txBody>
+                    <a:bodyPr/>
+                    <a:lstStyle/>
+                    <a:p>
+                      <a:r>
+                        <a:rPr lang="en-US" dirty="0" smtClean="0"/>
+                        <a:t>5 min</a:t>
+                      </a:r>
+                      <a:endParaRPr lang="en-US" dirty="0"/>
+                    </a:p>
+                  </a:txBody>
+                  <a:tcPr/>
+                </a:tc>
+                <a:tc>
+                  <a:txBody>
+                    <a:bodyPr/>
+                    <a:lstStyle/>
+                    <a:p>
+                      <a:r>
+                        <a:rPr lang="en-US" dirty="0" smtClean="0"/>
+                        <a:t>.50</a:t>
+                      </a:r>
+                      <a:endParaRPr lang="en-US" dirty="0"/>
+                    </a:p>
+                  </a:txBody>
+                  <a:tcPr/>
+                </a:tc>
+                <a:tc>
+                  <a:txBody>
+                    <a:bodyPr/>
+                    <a:lstStyle/>
+                    <a:p>
+                      <a:r>
+                        <a:rPr lang="en-US" dirty="0" smtClean="0"/>
+                        <a:t>.72</a:t>
+                      </a:r>
+                      <a:endParaRPr lang="en-US" dirty="0"/>
+                    </a:p>
+                  </a:txBody>
+                  <a:tcPr/>
+                </a:tc>
+                <a:tc>
+                  <a:txBody>
+                    <a:bodyPr/>
+                    <a:lstStyle/>
+                    <a:p>
+                      <a:r>
+                        <a:rPr lang="en-US" dirty="0" smtClean="0"/>
+                        <a:t>.22</a:t>
+                      </a:r>
+                      <a:endParaRPr lang="en-US" dirty="0"/>
+                    </a:p>
+                  </a:txBody>
+                  <a:tcPr/>
+                </a:tc>
+              </a:tr>
+              <a:tr h="401055">
+                <a:tc>
+                  <a:txBody>
+                    <a:bodyPr/>
+                    <a:lstStyle/>
+                    <a:p>
+                      <a:r>
+                        <a:rPr lang="en-US" dirty="0" smtClean="0">
+                          <a:solidFill>
+                            <a:srgbClr val="0070C0"/>
+                          </a:solidFill>
+                        </a:rPr>
+                        <a:t>CV Features</a:t>
+                      </a:r>
+                      <a:r>
+                        <a:rPr lang="en-US" baseline="0" dirty="0" smtClean="0">
+                          <a:solidFill>
+                            <a:srgbClr val="0070C0"/>
+                          </a:solidFill>
+                        </a:rPr>
+                        <a:t> SVM</a:t>
+                      </a:r>
+                      <a:endParaRPr lang="en-US" dirty="0">
+                        <a:solidFill>
+                          <a:srgbClr val="0070C0"/>
+                        </a:solidFill>
+                      </a:endParaRPr>
+                    </a:p>
+                  </a:txBody>
+                  <a:tcPr/>
+                </a:tc>
+                <a:tc>
+                  <a:txBody>
+                    <a:bodyPr/>
+                    <a:lstStyle/>
+                    <a:p>
+                      <a:r>
+                        <a:rPr lang="en-US" dirty="0" smtClean="0">
+                          <a:solidFill>
+                            <a:srgbClr val="0070C0"/>
+                          </a:solidFill>
+                        </a:rPr>
+                        <a:t>5</a:t>
+                      </a:r>
+                      <a:r>
+                        <a:rPr lang="en-US" baseline="0" dirty="0" smtClean="0">
+                          <a:solidFill>
+                            <a:srgbClr val="0070C0"/>
+                          </a:solidFill>
+                        </a:rPr>
+                        <a:t> min, up</a:t>
+                      </a:r>
+                      <a:endParaRPr lang="en-US" dirty="0">
+                        <a:solidFill>
+                          <a:srgbClr val="0070C0"/>
+                        </a:solidFill>
+                      </a:endParaRPr>
+                    </a:p>
+                  </a:txBody>
+                  <a:tcPr/>
+                </a:tc>
+                <a:tc>
+                  <a:txBody>
+                    <a:bodyPr/>
+                    <a:lstStyle/>
+                    <a:p>
+                      <a:r>
+                        <a:rPr lang="en-US" dirty="0" smtClean="0">
+                          <a:solidFill>
+                            <a:srgbClr val="0070C0"/>
+                          </a:solidFill>
+                        </a:rPr>
+                        <a:t>.50</a:t>
+                      </a:r>
+                      <a:endParaRPr lang="en-US" dirty="0">
+                        <a:solidFill>
+                          <a:srgbClr val="0070C0"/>
+                        </a:solidFill>
+                      </a:endParaRPr>
+                    </a:p>
+                  </a:txBody>
+                  <a:tcPr/>
+                </a:tc>
+                <a:tc>
+                  <a:txBody>
+                    <a:bodyPr/>
+                    <a:lstStyle/>
+                    <a:p>
+                      <a:r>
+                        <a:rPr lang="en-US" dirty="0" smtClean="0">
+                          <a:solidFill>
+                            <a:srgbClr val="0070C0"/>
+                          </a:solidFill>
+                        </a:rPr>
+                        <a:t>.78</a:t>
+                      </a:r>
+                      <a:endParaRPr lang="en-US" dirty="0">
+                        <a:solidFill>
+                          <a:srgbClr val="0070C0"/>
+                        </a:solidFill>
+                      </a:endParaRPr>
+                    </a:p>
+                  </a:txBody>
+                  <a:tcPr/>
+                </a:tc>
+                <a:tc>
+                  <a:txBody>
+                    <a:bodyPr/>
+                    <a:lstStyle/>
+                    <a:p>
+                      <a:r>
+                        <a:rPr lang="en-US" dirty="0" smtClean="0">
+                          <a:solidFill>
+                            <a:srgbClr val="0070C0"/>
+                          </a:solidFill>
+                        </a:rPr>
+                        <a:t>.28</a:t>
+                      </a:r>
+                      <a:endParaRPr lang="en-US" dirty="0">
+                        <a:solidFill>
+                          <a:srgbClr val="0070C0"/>
+                        </a:solidFill>
+                      </a:endParaRPr>
+                    </a:p>
+                  </a:txBody>
+                  <a:tcPr/>
+                </a:tc>
+              </a:tr>
+              <a:tr h="401055">
+                <a:tc>
+                  <a:txBody>
+                    <a:bodyPr/>
+                    <a:lstStyle/>
+                    <a:p>
+                      <a:r>
+                        <a:rPr lang="en-US" dirty="0" smtClean="0">
+                          <a:solidFill>
+                            <a:srgbClr val="0070C0"/>
+                          </a:solidFill>
+                        </a:rPr>
+                        <a:t>CV Features LR</a:t>
+                      </a:r>
+                      <a:endParaRPr lang="en-US" dirty="0">
+                        <a:solidFill>
+                          <a:srgbClr val="0070C0"/>
+                        </a:solidFill>
+                      </a:endParaRPr>
+                    </a:p>
+                  </a:txBody>
+                  <a:tcPr/>
+                </a:tc>
+                <a:tc>
+                  <a:txBody>
+                    <a:bodyPr/>
+                    <a:lstStyle/>
+                    <a:p>
+                      <a:r>
+                        <a:rPr lang="en-US" dirty="0" smtClean="0">
+                          <a:solidFill>
+                            <a:srgbClr val="0070C0"/>
+                          </a:solidFill>
+                        </a:rPr>
+                        <a:t>5 min, up</a:t>
+                      </a:r>
+                      <a:endParaRPr lang="en-US" dirty="0">
+                        <a:solidFill>
+                          <a:srgbClr val="0070C0"/>
+                        </a:solidFill>
+                      </a:endParaRPr>
+                    </a:p>
+                  </a:txBody>
+                  <a:tcPr/>
+                </a:tc>
+                <a:tc>
+                  <a:txBody>
+                    <a:bodyPr/>
+                    <a:lstStyle/>
+                    <a:p>
+                      <a:r>
+                        <a:rPr lang="en-US" dirty="0" smtClean="0">
+                          <a:solidFill>
+                            <a:srgbClr val="0070C0"/>
+                          </a:solidFill>
+                        </a:rPr>
+                        <a:t>.50</a:t>
+                      </a:r>
+                      <a:endParaRPr lang="en-US" dirty="0">
+                        <a:solidFill>
+                          <a:srgbClr val="0070C0"/>
+                        </a:solidFill>
+                      </a:endParaRPr>
+                    </a:p>
+                  </a:txBody>
+                  <a:tcPr/>
+                </a:tc>
+                <a:tc>
+                  <a:txBody>
+                    <a:bodyPr/>
+                    <a:lstStyle/>
+                    <a:p>
+                      <a:r>
+                        <a:rPr lang="en-US" dirty="0" smtClean="0">
+                          <a:solidFill>
+                            <a:srgbClr val="0070C0"/>
+                          </a:solidFill>
+                        </a:rPr>
+                        <a:t>.77</a:t>
+                      </a:r>
+                      <a:endParaRPr lang="en-US" dirty="0">
+                        <a:solidFill>
+                          <a:srgbClr val="0070C0"/>
+                        </a:solidFill>
+                      </a:endParaRPr>
+                    </a:p>
+                  </a:txBody>
+                  <a:tcPr/>
+                </a:tc>
+                <a:tc>
+                  <a:txBody>
+                    <a:bodyPr/>
+                    <a:lstStyle/>
+                    <a:p>
+                      <a:r>
+                        <a:rPr lang="en-US" dirty="0" smtClean="0">
+                          <a:solidFill>
+                            <a:srgbClr val="0070C0"/>
+                          </a:solidFill>
+                        </a:rPr>
+                        <a:t>.27</a:t>
+                      </a:r>
+                      <a:endParaRPr lang="en-US" dirty="0">
+                        <a:solidFill>
+                          <a:srgbClr val="0070C0"/>
+                        </a:solidFill>
+                      </a:endParaRPr>
+                    </a:p>
+                  </a:txBody>
+                  <a:tcPr/>
+                </a:tc>
+              </a:tr>
+            </a:tbl>
+          </a:graphicData>
+        </a:graphic>
+      </p:graphicFrame>
+    </p:spTree>
+    <p:extLst>
+      <p:ext uri="{BB962C8B-B14F-4D97-AF65-F5344CB8AC3E}">
+        <p14:creationId xmlns:p14="http://schemas.microsoft.com/office/powerpoint/2010/main" val="870337199"/>
+      </p:ext>
+    </p:extLst>
+  </p:cSld>
+  <p:clrMapOvr>
+    <a:masterClrMapping/>
+  </p:clrMapOvr>
+  <p:timing>
+    <p:tnLst>
+      <p:par>
+        <p:cTn id="1" dur="indefinite" restart="never" nodeType="tmRoot"/>
+      </p:par>
+    </p:tnLst>
+  </p:timing>
+</p:sld>
+</file>
+
+<file path=ppt/slides/slide8.xml><?xml version="1.0" encoding="utf-8"?>
+<p:sld xmlns:a="http://schemas.openxmlformats.org/drawingml/2006/main" xmlns:r="http://schemas.openxmlformats.org/officeDocument/2006/relationships" xmlns:p="http://schemas.openxmlformats.org/presentationml/2006/main">
+  <p:cSld>
+    <p:spTree>
+      <p:nvGrpSpPr>
+        <p:cNvPr id="1" name=""/>
+        <p:cNvGrpSpPr/>
+        <p:nvPr/>
+      </p:nvGrpSpPr>
+      <p:grpSpPr>
+        <a:xfrm>
+          <a:off x="0" y="0"/>
+          <a:ext cx="0" cy="0"/>
+          <a:chOff x="0" y="0"/>
+          <a:chExt cx="0" cy="0"/>
+        </a:xfrm>
+      </p:grpSpPr>
+      <p:sp>
+        <p:nvSpPr>
+          <p:cNvPr id="2" name="Title 1"/>
+          <p:cNvSpPr>
+            <a:spLocks noGrp="1"/>
+          </p:cNvSpPr>
+          <p:nvPr>
+            <p:ph type="title"/>
           </p:nvPr>
         </p:nvSpPr>
         <p:spPr/>
@@ -4445,7 +6061,36 @@
           <a:p>
             <a:r>
               <a:rPr lang="en-US" dirty="0" smtClean="0"/>
-              <a:t>Future avenues of exploration:</a:t>
+              <a:t>Next Steps</a:t>
+            </a:r>
+            <a:endParaRPr lang="en-US" dirty="0"/>
+          </a:p>
+        </p:txBody>
+      </p:sp>
+      <p:sp>
+        <p:nvSpPr>
+          <p:cNvPr id="3" name="Content Placeholder 2"/>
+          <p:cNvSpPr>
+            <a:spLocks noGrp="1"/>
+          </p:cNvSpPr>
+          <p:nvPr>
+            <p:ph idx="1"/>
+          </p:nvPr>
+        </p:nvSpPr>
+        <p:spPr/>
+        <p:txBody>
+          <a:bodyPr>
+            <a:normAutofit/>
+          </a:bodyPr>
+          <a:lstStyle/>
+          <a:p>
+            <a:r>
+              <a:rPr lang="en-US" b="1" dirty="0" smtClean="0"/>
+              <a:t>Future avenues </a:t>
+            </a:r>
+            <a:r>
+              <a:rPr lang="en-US" b="1" dirty="0" smtClean="0"/>
+              <a:t>of exploration:</a:t>
             </a:r>
           </a:p>
           <a:p>
@@ -4457,14 +6102,52 @@
           <a:p>
             <a:r>
               <a:rPr lang="en-US" dirty="0" smtClean="0"/>
-              <a:t>Alternative models to try</a:t>
-            </a:r>
-          </a:p>
-          <a:p>
-            <a:r>
-              <a:rPr lang="en-US" dirty="0" smtClean="0"/>
-              <a:t>Additional time-series features (stats on trailing features baked into current observation)</a:t>
-            </a:r>
+              <a:t>Alternative models to </a:t>
+            </a:r>
+            <a:r>
+              <a:rPr lang="en-US" dirty="0" smtClean="0"/>
+              <a:t>try on graphical data, particularly Artificial Neural Networks</a:t>
+            </a:r>
+          </a:p>
+          <a:p>
+            <a:r>
+              <a:rPr lang="en-US" dirty="0" smtClean="0"/>
+              <a:t>Additional CV-based features, e.g. custom </a:t>
+            </a:r>
+            <a:r>
+              <a:rPr lang="en-US" dirty="0" err="1" smtClean="0"/>
+              <a:t>Haar</a:t>
+            </a:r>
+            <a:r>
+              <a:rPr lang="en-US" dirty="0" smtClean="0"/>
+              <a:t> cascades</a:t>
+            </a:r>
+            <a:endParaRPr lang="en-US" dirty="0" smtClean="0"/>
+          </a:p>
+          <a:p>
+            <a:r>
+              <a:rPr lang="en-US" dirty="0" smtClean="0"/>
+              <a:t>Additional time-series features </a:t>
+            </a:r>
+            <a:r>
+              <a:rPr lang="en-US" dirty="0" smtClean="0"/>
+              <a:t>(weighted trailing feature stats </a:t>
+            </a:r>
+            <a:r>
+              <a:rPr lang="en-US" dirty="0" smtClean="0"/>
+              <a:t>baked into current observation</a:t>
+            </a:r>
+            <a:r>
+              <a:rPr lang="en-US" dirty="0" smtClean="0"/>
+              <a:t>)</a:t>
+            </a:r>
+          </a:p>
+          <a:p>
+            <a:r>
+              <a:rPr lang="en-US" dirty="0" smtClean="0"/>
+              <a:t>Further discretization of targets</a:t>
+            </a:r>
+            <a:endParaRPr lang="en-US" dirty="0" smtClean="0"/>
           </a:p>
           <a:p>
             <a:r>
@@ -4477,7 +6160,68 @@
             </a:r>
             <a:r>
               <a:rPr lang="en-US" dirty="0" smtClean="0"/>
-              <a:t>” since Python is nice for this sort of thing (web scraping a set of tickers, functions for more loops, etc.)</a:t>
+              <a:t>” since Python is </a:t>
+            </a:r>
+            <a:r>
+              <a:rPr lang="en-US" dirty="0" smtClean="0"/>
+              <a:t>very nice </a:t>
+            </a:r>
+            <a:r>
+              <a:rPr lang="en-US" dirty="0" smtClean="0"/>
+              <a:t>for this sort of </a:t>
+            </a:r>
+            <a:r>
+              <a:rPr lang="en-US" dirty="0" smtClean="0"/>
+              <a:t>thing:</a:t>
+            </a:r>
+          </a:p>
+          <a:p>
+            <a:pPr lvl="1"/>
+            <a:r>
+              <a:rPr lang="en-US" dirty="0" smtClean="0"/>
+              <a:t>Web </a:t>
+            </a:r>
+            <a:r>
+              <a:rPr lang="en-US" dirty="0" smtClean="0"/>
+              <a:t>scraping a set of </a:t>
+            </a:r>
+            <a:r>
+              <a:rPr lang="en-US" dirty="0" smtClean="0"/>
+              <a:t>tickers</a:t>
+            </a:r>
+          </a:p>
+          <a:p>
+            <a:pPr lvl="1"/>
+            <a:r>
+              <a:rPr lang="en-US" dirty="0"/>
+              <a:t>F</a:t>
+            </a:r>
+            <a:r>
+              <a:rPr lang="en-US" dirty="0" smtClean="0"/>
+              <a:t>unctions </a:t>
+            </a:r>
+            <a:r>
+              <a:rPr lang="en-US" dirty="0" smtClean="0"/>
+              <a:t>for more </a:t>
+            </a:r>
+            <a:r>
+              <a:rPr lang="en-US" dirty="0" smtClean="0"/>
+              <a:t>loops</a:t>
+            </a:r>
+          </a:p>
+          <a:p>
+            <a:pPr lvl="1"/>
+            <a:r>
+              <a:rPr lang="en-US" dirty="0" smtClean="0"/>
+              <a:t>Grid searching optimal time slice and </a:t>
+            </a:r>
+            <a:r>
+              <a:rPr lang="en-US" dirty="0" err="1" smtClean="0"/>
+              <a:t>lookahead</a:t>
+            </a:r>
+            <a:r>
+              <a:rPr lang="en-US" dirty="0" smtClean="0"/>
+              <a:t> combinations</a:t>
             </a:r>
             <a:endParaRPr lang="en-US" dirty="0"/>
           </a:p>
@@ -4503,7 +6247,7 @@
 </p:sld>
 </file>
 
-<file path=ppt/slides/slide8.xml><?xml version="1.0" encoding="utf-8"?>
+<file path=ppt/slides/slide9.xml><?xml version="1.0" encoding="utf-8"?>
 <p:sld xmlns:a="http://schemas.openxmlformats.org/drawingml/2006/main" xmlns:r="http://schemas.openxmlformats.org/officeDocument/2006/relationships" xmlns:p="http://schemas.openxmlformats.org/presentationml/2006/main">
   <p:cSld>
     <p:spTree>

</xml_diff>

<commit_message>
small edits to slides and paper
</commit_message>
<xml_diff>
--- a/project_presentation.pptx
+++ b/project_presentation.pptx
@@ -346,7 +346,7 @@
           <a:p>
             <a:fld id="{4BDF68E2-58F2-4D09-BE8B-E3BD06533059}" type="datetimeFigureOut">
               <a:rPr lang="en-US" dirty="0"/>
-              <a:t>3/15/2015</a:t>
+              <a:t>3/16/2015</a:t>
             </a:fld>
             <a:endParaRPr lang="en-US" dirty="0"/>
           </a:p>
@@ -549,7 +549,7 @@
           <a:p>
             <a:fld id="{2E2D6473-DF6D-4702-B328-E0DD40540A4E}" type="datetimeFigureOut">
               <a:rPr lang="en-US" dirty="0"/>
-              <a:t>3/15/2015</a:t>
+              <a:t>3/16/2015</a:t>
             </a:fld>
             <a:endParaRPr lang="en-US" dirty="0"/>
           </a:p>
@@ -800,7 +800,7 @@
           <a:p>
             <a:fld id="{E26F7E3A-B166-407D-9866-32884E7D5B37}" type="datetimeFigureOut">
               <a:rPr lang="en-US" dirty="0"/>
-              <a:t>3/15/2015</a:t>
+              <a:t>3/16/2015</a:t>
             </a:fld>
             <a:endParaRPr lang="en-US" dirty="0"/>
           </a:p>
@@ -969,7 +969,7 @@
           <a:p>
             <a:fld id="{528FC5F6-F338-4AE4-BB23-26385BCFC423}" type="datetimeFigureOut">
               <a:rPr lang="en-US" dirty="0"/>
-              <a:t>3/15/2015</a:t>
+              <a:t>3/16/2015</a:t>
             </a:fld>
             <a:endParaRPr lang="en-US" dirty="0"/>
           </a:p>
@@ -1307,7 +1307,7 @@
           <a:p>
             <a:fld id="{20EBB0C4-6273-4C6E-B9BD-2EDC30F1CD52}" type="datetimeFigureOut">
               <a:rPr lang="en-US" dirty="0"/>
-              <a:t>3/15/2015</a:t>
+              <a:t>3/16/2015</a:t>
             </a:fld>
             <a:endParaRPr lang="en-US" dirty="0"/>
           </a:p>
@@ -1577,7 +1577,7 @@
           <a:p>
             <a:fld id="{19AB4D41-86C1-4908-B66A-0B50CEB3BF29}" type="datetimeFigureOut">
               <a:rPr lang="en-US" dirty="0"/>
-              <a:t>3/15/2015</a:t>
+              <a:t>3/16/2015</a:t>
             </a:fld>
             <a:endParaRPr lang="en-US" dirty="0"/>
           </a:p>
@@ -1951,7 +1951,7 @@
           <a:p>
             <a:fld id="{E6426E2C-56C1-4E0D-A793-0088A7FDD37E}" type="datetimeFigureOut">
               <a:rPr lang="en-US" dirty="0"/>
-              <a:t>3/15/2015</a:t>
+              <a:t>3/16/2015</a:t>
             </a:fld>
             <a:endParaRPr lang="en-US" dirty="0"/>
           </a:p>
@@ -2064,7 +2064,7 @@
           <a:p>
             <a:fld id="{C8C39B41-D8B5-4052-B551-9B5525EAA8B6}" type="datetimeFigureOut">
               <a:rPr lang="en-US" dirty="0"/>
-              <a:t>3/15/2015</a:t>
+              <a:t>3/16/2015</a:t>
             </a:fld>
             <a:endParaRPr lang="en-US" dirty="0"/>
           </a:p>
@@ -2230,7 +2230,7 @@
           <a:p>
             <a:fld id="{4D94136C-8742-45B2-AF27-D93DF72833A9}" type="datetimeFigureOut">
               <a:rPr lang="en-US" dirty="0"/>
-              <a:t>3/15/2015</a:t>
+              <a:t>3/16/2015</a:t>
             </a:fld>
             <a:endParaRPr lang="en-US" dirty="0"/>
           </a:p>
@@ -2580,7 +2580,7 @@
           <a:p>
             <a:fld id="{32ABBEA6-7C60-4B02-AE87-00D78D8422AF}" type="datetimeFigureOut">
               <a:rPr lang="en-US" dirty="0"/>
-              <a:t>3/15/2015</a:t>
+              <a:t>3/16/2015</a:t>
             </a:fld>
             <a:endParaRPr lang="en-US" dirty="0"/>
           </a:p>
@@ -2958,7 +2958,7 @@
           <a:p>
             <a:fld id="{C9CAD897-D46E-4AD2-BD9B-49DD3E640873}" type="datetimeFigureOut">
               <a:rPr lang="en-US" dirty="0"/>
-              <a:t>3/15/2015</a:t>
+              <a:t>3/16/2015</a:t>
             </a:fld>
             <a:endParaRPr lang="en-US" dirty="0"/>
           </a:p>
@@ -3240,7 +3240,7 @@
           <a:p>
             <a:fld id="{98624D31-43A5-475A-80CF-332C9F6DCF35}" type="datetimeFigureOut">
               <a:rPr lang="en-US" dirty="0"/>
-              <a:t>3/15/2015</a:t>
+              <a:t>3/16/2015</a:t>
             </a:fld>
             <a:endParaRPr lang="en-US" dirty="0"/>
           </a:p>
@@ -3890,14 +3890,26 @@
           <a:p>
             <a:r>
               <a:rPr lang="en-US" b="1" dirty="0" smtClean="0"/>
-              <a:t>Can visual features be used for predictive modeling? </a:t>
+              <a:t>Can visual features be used for predictive </a:t>
+            </a:r>
+            <a:r>
+              <a:rPr lang="en-US" b="1" dirty="0" smtClean="0"/>
+              <a:t>modeling of security prices? </a:t>
             </a:r>
             <a:endParaRPr lang="en-US" b="1" dirty="0"/>
           </a:p>
           <a:p>
             <a:r>
               <a:rPr lang="en-US" dirty="0" smtClean="0"/>
-              <a:t>“Technical analysis” attempts to do so, with humans as the “model”… but is basically bunk</a:t>
+              <a:t>“Technical analysis” attempts to do so, with humans as the </a:t>
+            </a:r>
+            <a:r>
+              <a:rPr lang="en-US" dirty="0" smtClean="0"/>
+              <a:t>“algorithm”… </a:t>
+            </a:r>
+            <a:r>
+              <a:rPr lang="en-US" dirty="0" smtClean="0"/>
+              <a:t>but is basically bunk</a:t>
             </a:r>
           </a:p>
           <a:p>
@@ -4128,7 +4140,7 @@
         </p:spPr>
         <p:txBody>
           <a:bodyPr>
-            <a:normAutofit lnSpcReduction="10000"/>
+            <a:normAutofit fontScale="92500" lnSpcReduction="10000"/>
           </a:bodyPr>
           <a:lstStyle/>
           <a:p>
@@ -4166,7 +4178,15 @@
           <a:p>
             <a:r>
               <a:rPr lang="en-US" dirty="0" smtClean="0"/>
-              <a:t>Indexing is important, to keep us honest and not allowing our models to peer into the future</a:t>
+              <a:t>Time indexing is </a:t>
+            </a:r>
+            <a:r>
+              <a:rPr lang="en-US" dirty="0" smtClean="0"/>
+              <a:t>important, to keep </a:t>
+            </a:r>
+            <a:r>
+              <a:rPr lang="en-US" dirty="0" smtClean="0"/>
+              <a:t>our models honest by barring them from peering into the future</a:t>
             </a:r>
             <a:endParaRPr lang="en-US" dirty="0"/>
           </a:p>
@@ -4243,7 +4263,11 @@
           <a:p>
             <a:r>
               <a:rPr lang="en-US" dirty="0" smtClean="0"/>
-              <a:t>The Approach</a:t>
+              <a:t>The </a:t>
+            </a:r>
+            <a:r>
+              <a:rPr lang="en-US" dirty="0" smtClean="0"/>
+              <a:t>Modeling Approach</a:t>
             </a:r>
             <a:endParaRPr lang="en-US" dirty="0"/>
           </a:p>
@@ -4270,11 +4294,7 @@
             </a:pPr>
             <a:r>
               <a:rPr lang="en-US" dirty="0" smtClean="0"/>
-              <a:t>Obtain appropriate time series data </a:t>
-            </a:r>
-            <a:r>
-              <a:rPr lang="en-US" dirty="0" smtClean="0"/>
-              <a:t>(minute level)</a:t>
+              <a:t>Obtain appropriate time series data (minute level)</a:t>
             </a:r>
           </a:p>
           <a:p>
@@ -4284,24 +4304,23 @@
             </a:pPr>
             <a:r>
               <a:rPr lang="en-US" dirty="0" smtClean="0"/>
-              <a:t>Slice </a:t>
-            </a:r>
-            <a:r>
-              <a:rPr lang="en-US" dirty="0" smtClean="0"/>
-              <a:t>into </a:t>
-            </a:r>
-            <a:r>
-              <a:rPr lang="en-US" dirty="0" smtClean="0"/>
-              <a:t>windows </a:t>
+              <a:t>Slice into windows </a:t>
             </a:r>
           </a:p>
           <a:p>
             <a:pPr marL="635508" lvl="1" indent="-342900"/>
             <a:r>
               <a:rPr lang="en-US" dirty="0" smtClean="0"/>
-              <a:t>Window length is somewhat arbitrary, but impacts predictions, so can be tuned depending on use case (macro vs. HFT, e.g.)</a:t>
-            </a:r>
-            <a:endParaRPr lang="en-US" dirty="0" smtClean="0"/>
+              <a:t>Window length is somewhat arbitrary, but impacts predictions, so can be tuned depending on </a:t>
+            </a:r>
+            <a:r>
+              <a:rPr lang="en-US" dirty="0" smtClean="0"/>
+              <a:t>specific use </a:t>
+            </a:r>
+            <a:r>
+              <a:rPr lang="en-US" dirty="0" smtClean="0"/>
+              <a:t>case (macro vs. HFT, e.g.)</a:t>
+            </a:r>
           </a:p>
           <a:p>
             <a:pPr marL="457200" indent="-457200">
@@ -4310,15 +4329,7 @@
             </a:pPr>
             <a:r>
               <a:rPr lang="en-US" dirty="0" smtClean="0"/>
-              <a:t>Graph </a:t>
-            </a:r>
-            <a:r>
-              <a:rPr lang="en-US" dirty="0" smtClean="0"/>
-              <a:t>data for each </a:t>
-            </a:r>
-            <a:r>
-              <a:rPr lang="en-US" dirty="0" smtClean="0"/>
-              <a:t>window and save as images</a:t>
+              <a:t>Graph data for each window and save as images</a:t>
             </a:r>
           </a:p>
           <a:p>
@@ -4328,14 +4339,23 @@
             </a:pPr>
             <a:r>
               <a:rPr lang="en-US" dirty="0" smtClean="0"/>
-              <a:t>Use computer vision (CV) to extract features</a:t>
-            </a:r>
+              <a:t>Use computer vision (CV) to extract </a:t>
+            </a:r>
+            <a:r>
+              <a:rPr lang="en-US" dirty="0" smtClean="0"/>
+              <a:t>features:</a:t>
+            </a:r>
+            <a:endParaRPr lang="en-US" dirty="0" smtClean="0"/>
           </a:p>
           <a:p>
             <a:pPr marL="749808" lvl="1" indent="-457200"/>
             <a:r>
               <a:rPr lang="en-US" dirty="0" smtClean="0"/>
-              <a:t>Directly from images</a:t>
+              <a:t>Directly from </a:t>
+            </a:r>
+            <a:r>
+              <a:rPr lang="en-US" dirty="0" smtClean="0"/>
+              <a:t>images using linear feature extraction</a:t>
             </a:r>
             <a:endParaRPr lang="en-US" dirty="0" smtClean="0"/>
           </a:p>
@@ -4343,24 +4363,37 @@
             <a:pPr marL="749808" lvl="1" indent="-457200"/>
             <a:r>
               <a:rPr lang="en-US" dirty="0" smtClean="0"/>
-              <a:t>Convert </a:t>
-            </a:r>
-            <a:r>
-              <a:rPr lang="en-US" dirty="0" smtClean="0"/>
-              <a:t>the graph to pixel intensity </a:t>
-            </a:r>
-            <a:r>
-              <a:rPr lang="en-US" dirty="0" smtClean="0"/>
-              <a:t>data, then unroll </a:t>
-            </a:r>
-            <a:r>
-              <a:rPr lang="en-US" dirty="0" smtClean="0"/>
-              <a:t>the pixel data vector into a set of 100s to 1000s of new features for each observation, “generated” from the underlying 4-5 </a:t>
-            </a:r>
-            <a:r>
-              <a:rPr lang="en-US" dirty="0" smtClean="0"/>
-              <a:t>points</a:t>
-            </a:r>
+              <a:t>Indirectly, by converting the </a:t>
+            </a:r>
+            <a:r>
+              <a:rPr lang="en-US" dirty="0" smtClean="0"/>
+              <a:t>graph to pixel intensity data, then </a:t>
+            </a:r>
+            <a:r>
+              <a:rPr lang="en-US" dirty="0" smtClean="0"/>
+              <a:t>unrolling </a:t>
+            </a:r>
+            <a:r>
+              <a:rPr lang="en-US" dirty="0" smtClean="0"/>
+              <a:t>the pixel data </a:t>
+            </a:r>
+            <a:r>
+              <a:rPr lang="en-US" dirty="0" smtClean="0"/>
+              <a:t>matrix into a </a:t>
+            </a:r>
+            <a:r>
+              <a:rPr lang="en-US" dirty="0" smtClean="0"/>
+              <a:t>vector 1000s </a:t>
+            </a:r>
+            <a:r>
+              <a:rPr lang="en-US" dirty="0" smtClean="0"/>
+              <a:t>of new features for each observation, “generated” from the underlying </a:t>
+            </a:r>
+            <a:r>
+              <a:rPr lang="en-US" dirty="0" smtClean="0"/>
+              <a:t>price data</a:t>
+            </a:r>
+            <a:endParaRPr lang="en-US" dirty="0" smtClean="0"/>
           </a:p>
           <a:p>
             <a:pPr marL="457200" indent="-457200">
@@ -4429,7 +4462,11 @@
           <a:p>
             <a:r>
               <a:rPr lang="en-US" dirty="0" smtClean="0"/>
-              <a:t>Approach, continued</a:t>
+              <a:t>Modeling Approach</a:t>
+            </a:r>
+            <a:r>
+              <a:rPr lang="en-US" dirty="0" smtClean="0"/>
+              <a:t>, continued</a:t>
             </a:r>
             <a:endParaRPr lang="en-US" dirty="0"/>
           </a:p>
@@ -4923,27 +4960,24 @@
           <a:p>
             <a:r>
               <a:rPr lang="en-US" dirty="0" smtClean="0"/>
-              <a:t>Having patience while trying to train models on massive datasets (~ 6,000 x 30,000 matrix)</a:t>
+              <a:t>Having patience while trying to train models on massive datasets (~ 6,000 x 30,000 </a:t>
+            </a:r>
+            <a:r>
+              <a:rPr lang="en-US" dirty="0" smtClean="0"/>
+              <a:t>matrix of raw pixel data)</a:t>
             </a:r>
             <a:endParaRPr lang="en-US" dirty="0" smtClean="0"/>
           </a:p>
           <a:p>
             <a:r>
               <a:rPr lang="en-US" dirty="0" smtClean="0"/>
-              <a:t>Not </a:t>
-            </a:r>
-            <a:r>
-              <a:rPr lang="en-US" dirty="0" smtClean="0"/>
-              <a:t>being able to use regular </a:t>
-            </a:r>
-            <a:r>
-              <a:rPr lang="en-US" dirty="0" smtClean="0"/>
-              <a:t>TTS / </a:t>
-            </a:r>
-            <a:r>
-              <a:rPr lang="en-US" dirty="0" smtClean="0"/>
-              <a:t>Cross-Validation</a:t>
-            </a:r>
+              <a:t>Not being able to use regular TTS / </a:t>
+            </a:r>
+            <a:r>
+              <a:rPr lang="en-US" dirty="0" smtClean="0"/>
+              <a:t>Cross-Validation due to time series data</a:t>
+            </a:r>
+            <a:endParaRPr lang="en-US" dirty="0" smtClean="0"/>
           </a:p>
           <a:p>
             <a:r>
@@ -4956,7 +4990,6 @@
               <a:rPr lang="en-US" dirty="0" smtClean="0"/>
               <a:t>Time constraints on learning and applying new modeling techniques</a:t>
             </a:r>
-            <a:endParaRPr lang="en-US" dirty="0" smtClean="0"/>
           </a:p>
           <a:p>
             <a:endParaRPr lang="en-US" dirty="0"/>
@@ -5094,9 +5127,16 @@
           <a:p>
             <a:r>
               <a:rPr lang="en-US" dirty="0" smtClean="0"/>
-              <a:t>Models varied in performance over these data, but high end performance was impressive</a:t>
-            </a:r>
-            <a:endParaRPr lang="en-US" dirty="0" smtClean="0"/>
+              <a:t>Models varied in performance over these </a:t>
+            </a:r>
+            <a:r>
+              <a:rPr lang="en-US" dirty="0" smtClean="0"/>
+              <a:t>data; high </a:t>
+            </a:r>
+            <a:r>
+              <a:rPr lang="en-US" dirty="0" smtClean="0"/>
+              <a:t>end performance was impressive</a:t>
+            </a:r>
           </a:p>
           <a:p>
             <a:r>
@@ -6080,17 +6120,13 @@
         <p:spPr/>
         <p:txBody>
           <a:bodyPr>
-            <a:normAutofit/>
+            <a:normAutofit lnSpcReduction="10000"/>
           </a:bodyPr>
           <a:lstStyle/>
           <a:p>
             <a:r>
               <a:rPr lang="en-US" b="1" dirty="0" smtClean="0"/>
-              <a:t>Future avenues </a:t>
-            </a:r>
-            <a:r>
-              <a:rPr lang="en-US" b="1" dirty="0" smtClean="0"/>
-              <a:t>of exploration:</a:t>
+              <a:t>Future avenues of exploration:</a:t>
             </a:r>
           </a:p>
           <a:p>
@@ -6102,11 +6138,7 @@
           <a:p>
             <a:r>
               <a:rPr lang="en-US" dirty="0" smtClean="0"/>
-              <a:t>Alternative models to </a:t>
-            </a:r>
-            <a:r>
-              <a:rPr lang="en-US" dirty="0" smtClean="0"/>
-              <a:t>try on graphical data, particularly Artificial Neural Networks</a:t>
+              <a:t>Alternative models to try on graphical data, particularly Artificial Neural Networks</a:t>
             </a:r>
           </a:p>
           <a:p>
@@ -6122,32 +6154,31 @@
               <a:rPr lang="en-US" dirty="0" smtClean="0"/>
               <a:t> cascades</a:t>
             </a:r>
+          </a:p>
+          <a:p>
+            <a:r>
+              <a:rPr lang="en-US" dirty="0" smtClean="0"/>
+              <a:t>Additional time-series </a:t>
+            </a:r>
+            <a:r>
+              <a:rPr lang="en-US" dirty="0" smtClean="0"/>
+              <a:t>features, e.g. weighted </a:t>
+            </a:r>
+            <a:r>
+              <a:rPr lang="en-US" dirty="0" smtClean="0"/>
+              <a:t>trailing feature stats baked into current </a:t>
+            </a:r>
+            <a:r>
+              <a:rPr lang="en-US" dirty="0" smtClean="0"/>
+              <a:t>observation</a:t>
+            </a:r>
             <a:endParaRPr lang="en-US" dirty="0" smtClean="0"/>
           </a:p>
           <a:p>
             <a:r>
               <a:rPr lang="en-US" dirty="0" smtClean="0"/>
-              <a:t>Additional time-series features </a:t>
-            </a:r>
-            <a:r>
-              <a:rPr lang="en-US" dirty="0" smtClean="0"/>
-              <a:t>(weighted trailing feature stats </a:t>
-            </a:r>
-            <a:r>
-              <a:rPr lang="en-US" dirty="0" smtClean="0"/>
-              <a:t>baked into current observation</a:t>
-            </a:r>
-            <a:r>
-              <a:rPr lang="en-US" dirty="0" smtClean="0"/>
-              <a:t>)</a:t>
-            </a:r>
-          </a:p>
-          <a:p>
-            <a:r>
-              <a:rPr lang="en-US" dirty="0" smtClean="0"/>
               <a:t>Further discretization of targets</a:t>
             </a:r>
-            <a:endParaRPr lang="en-US" dirty="0" smtClean="0"/>
           </a:p>
           <a:p>
             <a:r>
@@ -6160,34 +6191,26 @@
             </a:r>
             <a:r>
               <a:rPr lang="en-US" dirty="0" smtClean="0"/>
-              <a:t>” since Python is </a:t>
-            </a:r>
-            <a:r>
-              <a:rPr lang="en-US" dirty="0" smtClean="0"/>
-              <a:t>very nice </a:t>
-            </a:r>
-            <a:r>
-              <a:rPr lang="en-US" dirty="0" smtClean="0"/>
-              <a:t>for this sort of </a:t>
-            </a:r>
-            <a:r>
-              <a:rPr lang="en-US" dirty="0" smtClean="0"/>
-              <a:t>thing:</a:t>
+              <a:t>” </a:t>
+            </a:r>
+            <a:r>
+              <a:rPr lang="en-US" dirty="0" smtClean="0"/>
+              <a:t>of analytic processes </a:t>
+            </a:r>
+            <a:r>
+              <a:rPr lang="en-US" dirty="0" smtClean="0"/>
+              <a:t>as </a:t>
+            </a:r>
+            <a:r>
+              <a:rPr lang="en-US" dirty="0" smtClean="0"/>
+              <a:t>Python is very nice for this sort of thing:</a:t>
             </a:r>
           </a:p>
           <a:p>
             <a:pPr lvl="1"/>
             <a:r>
               <a:rPr lang="en-US" dirty="0" smtClean="0"/>
-              <a:t>Web </a:t>
-            </a:r>
-            <a:r>
-              <a:rPr lang="en-US" dirty="0" smtClean="0"/>
-              <a:t>scraping a set of </a:t>
-            </a:r>
-            <a:r>
-              <a:rPr lang="en-US" dirty="0" smtClean="0"/>
-              <a:t>tickers</a:t>
+              <a:t>Web scraping a set of tickers</a:t>
             </a:r>
           </a:p>
           <a:p>
@@ -6198,15 +6221,7 @@
             </a:r>
             <a:r>
               <a:rPr lang="en-US" dirty="0" smtClean="0"/>
-              <a:t>unctions </a:t>
-            </a:r>
-            <a:r>
-              <a:rPr lang="en-US" dirty="0" smtClean="0"/>
-              <a:t>for more </a:t>
-            </a:r>
-            <a:r>
-              <a:rPr lang="en-US" dirty="0" smtClean="0"/>
-              <a:t>loops</a:t>
+              <a:t>unctions for more loops</a:t>
             </a:r>
           </a:p>
           <a:p>

</xml_diff>

<commit_message>
errata for CV model results in paper / presentation
</commit_message>
<xml_diff>
--- a/project_presentation.pptx
+++ b/project_presentation.pptx
@@ -346,7 +346,7 @@
           <a:p>
             <a:fld id="{4BDF68E2-58F2-4D09-BE8B-E3BD06533059}" type="datetimeFigureOut">
               <a:rPr lang="en-US" dirty="0"/>
-              <a:t>3/16/2015</a:t>
+              <a:t>3/17/2015</a:t>
             </a:fld>
             <a:endParaRPr lang="en-US" dirty="0"/>
           </a:p>
@@ -549,7 +549,7 @@
           <a:p>
             <a:fld id="{2E2D6473-DF6D-4702-B328-E0DD40540A4E}" type="datetimeFigureOut">
               <a:rPr lang="en-US" dirty="0"/>
-              <a:t>3/16/2015</a:t>
+              <a:t>3/17/2015</a:t>
             </a:fld>
             <a:endParaRPr lang="en-US" dirty="0"/>
           </a:p>
@@ -800,7 +800,7 @@
           <a:p>
             <a:fld id="{E26F7E3A-B166-407D-9866-32884E7D5B37}" type="datetimeFigureOut">
               <a:rPr lang="en-US" dirty="0"/>
-              <a:t>3/16/2015</a:t>
+              <a:t>3/17/2015</a:t>
             </a:fld>
             <a:endParaRPr lang="en-US" dirty="0"/>
           </a:p>
@@ -969,7 +969,7 @@
           <a:p>
             <a:fld id="{528FC5F6-F338-4AE4-BB23-26385BCFC423}" type="datetimeFigureOut">
               <a:rPr lang="en-US" dirty="0"/>
-              <a:t>3/16/2015</a:t>
+              <a:t>3/17/2015</a:t>
             </a:fld>
             <a:endParaRPr lang="en-US" dirty="0"/>
           </a:p>
@@ -1307,7 +1307,7 @@
           <a:p>
             <a:fld id="{20EBB0C4-6273-4C6E-B9BD-2EDC30F1CD52}" type="datetimeFigureOut">
               <a:rPr lang="en-US" dirty="0"/>
-              <a:t>3/16/2015</a:t>
+              <a:t>3/17/2015</a:t>
             </a:fld>
             <a:endParaRPr lang="en-US" dirty="0"/>
           </a:p>
@@ -1577,7 +1577,7 @@
           <a:p>
             <a:fld id="{19AB4D41-86C1-4908-B66A-0B50CEB3BF29}" type="datetimeFigureOut">
               <a:rPr lang="en-US" dirty="0"/>
-              <a:t>3/16/2015</a:t>
+              <a:t>3/17/2015</a:t>
             </a:fld>
             <a:endParaRPr lang="en-US" dirty="0"/>
           </a:p>
@@ -1951,7 +1951,7 @@
           <a:p>
             <a:fld id="{E6426E2C-56C1-4E0D-A793-0088A7FDD37E}" type="datetimeFigureOut">
               <a:rPr lang="en-US" dirty="0"/>
-              <a:t>3/16/2015</a:t>
+              <a:t>3/17/2015</a:t>
             </a:fld>
             <a:endParaRPr lang="en-US" dirty="0"/>
           </a:p>
@@ -2064,7 +2064,7 @@
           <a:p>
             <a:fld id="{C8C39B41-D8B5-4052-B551-9B5525EAA8B6}" type="datetimeFigureOut">
               <a:rPr lang="en-US" dirty="0"/>
-              <a:t>3/16/2015</a:t>
+              <a:t>3/17/2015</a:t>
             </a:fld>
             <a:endParaRPr lang="en-US" dirty="0"/>
           </a:p>
@@ -2230,7 +2230,7 @@
           <a:p>
             <a:fld id="{4D94136C-8742-45B2-AF27-D93DF72833A9}" type="datetimeFigureOut">
               <a:rPr lang="en-US" dirty="0"/>
-              <a:t>3/16/2015</a:t>
+              <a:t>3/17/2015</a:t>
             </a:fld>
             <a:endParaRPr lang="en-US" dirty="0"/>
           </a:p>
@@ -2580,7 +2580,7 @@
           <a:p>
             <a:fld id="{32ABBEA6-7C60-4B02-AE87-00D78D8422AF}" type="datetimeFigureOut">
               <a:rPr lang="en-US" dirty="0"/>
-              <a:t>3/16/2015</a:t>
+              <a:t>3/17/2015</a:t>
             </a:fld>
             <a:endParaRPr lang="en-US" dirty="0"/>
           </a:p>
@@ -2958,7 +2958,7 @@
           <a:p>
             <a:fld id="{C9CAD897-D46E-4AD2-BD9B-49DD3E640873}" type="datetimeFigureOut">
               <a:rPr lang="en-US" dirty="0"/>
-              <a:t>3/16/2015</a:t>
+              <a:t>3/17/2015</a:t>
             </a:fld>
             <a:endParaRPr lang="en-US" dirty="0"/>
           </a:p>
@@ -3240,7 +3240,7 @@
           <a:p>
             <a:fld id="{98624D31-43A5-475A-80CF-332C9F6DCF35}" type="datetimeFigureOut">
               <a:rPr lang="en-US" dirty="0"/>
-              <a:t>3/16/2015</a:t>
+              <a:t>3/17/2015</a:t>
             </a:fld>
             <a:endParaRPr lang="en-US" dirty="0"/>
           </a:p>
@@ -3890,26 +3890,14 @@
           <a:p>
             <a:r>
               <a:rPr lang="en-US" b="1" dirty="0" smtClean="0"/>
-              <a:t>Can visual features be used for predictive </a:t>
-            </a:r>
-            <a:r>
-              <a:rPr lang="en-US" b="1" dirty="0" smtClean="0"/>
-              <a:t>modeling of security prices? </a:t>
+              <a:t>Can visual features be used for predictive modeling of security prices? </a:t>
             </a:r>
             <a:endParaRPr lang="en-US" b="1" dirty="0"/>
           </a:p>
           <a:p>
             <a:r>
               <a:rPr lang="en-US" dirty="0" smtClean="0"/>
-              <a:t>“Technical analysis” attempts to do so, with humans as the </a:t>
-            </a:r>
-            <a:r>
-              <a:rPr lang="en-US" dirty="0" smtClean="0"/>
-              <a:t>“algorithm”… </a:t>
-            </a:r>
-            <a:r>
-              <a:rPr lang="en-US" dirty="0" smtClean="0"/>
-              <a:t>but is basically bunk</a:t>
+              <a:t>“Technical analysis” attempts to do so, with humans as the “algorithm”… but is basically bunk</a:t>
             </a:r>
           </a:p>
           <a:p>
@@ -4178,15 +4166,7 @@
           <a:p>
             <a:r>
               <a:rPr lang="en-US" dirty="0" smtClean="0"/>
-              <a:t>Time indexing is </a:t>
-            </a:r>
-            <a:r>
-              <a:rPr lang="en-US" dirty="0" smtClean="0"/>
-              <a:t>important, to keep </a:t>
-            </a:r>
-            <a:r>
-              <a:rPr lang="en-US" dirty="0" smtClean="0"/>
-              <a:t>our models honest by barring them from peering into the future</a:t>
+              <a:t>Time indexing is important, to keep our models honest by barring them from peering into the future</a:t>
             </a:r>
             <a:endParaRPr lang="en-US" dirty="0"/>
           </a:p>
@@ -4263,11 +4243,7 @@
           <a:p>
             <a:r>
               <a:rPr lang="en-US" dirty="0" smtClean="0"/>
-              <a:t>The </a:t>
-            </a:r>
-            <a:r>
-              <a:rPr lang="en-US" dirty="0" smtClean="0"/>
-              <a:t>Modeling Approach</a:t>
+              <a:t>The Modeling Approach</a:t>
             </a:r>
             <a:endParaRPr lang="en-US" dirty="0"/>
           </a:p>
@@ -4311,15 +4287,7 @@
             <a:pPr marL="635508" lvl="1" indent="-342900"/>
             <a:r>
               <a:rPr lang="en-US" dirty="0" smtClean="0"/>
-              <a:t>Window length is somewhat arbitrary, but impacts predictions, so can be tuned depending on </a:t>
-            </a:r>
-            <a:r>
-              <a:rPr lang="en-US" dirty="0" smtClean="0"/>
-              <a:t>specific use </a:t>
-            </a:r>
-            <a:r>
-              <a:rPr lang="en-US" dirty="0" smtClean="0"/>
-              <a:t>case (macro vs. HFT, e.g.)</a:t>
+              <a:t>Window length is somewhat arbitrary, but impacts predictions, so can be tuned depending on specific use case (macro vs. HFT, e.g.)</a:t>
             </a:r>
           </a:p>
           <a:p>
@@ -4339,61 +4307,22 @@
             </a:pPr>
             <a:r>
               <a:rPr lang="en-US" dirty="0" smtClean="0"/>
-              <a:t>Use computer vision (CV) to extract </a:t>
-            </a:r>
+              <a:t>Use computer vision (CV) to extract features:</a:t>
+            </a:r>
+          </a:p>
+          <a:p>
+            <a:pPr marL="749808" lvl="1" indent="-457200"/>
             <a:r>
               <a:rPr lang="en-US" dirty="0" smtClean="0"/>
-              <a:t>features:</a:t>
-            </a:r>
-            <a:endParaRPr lang="en-US" dirty="0" smtClean="0"/>
+              <a:t>Directly from images using linear feature extraction</a:t>
+            </a:r>
           </a:p>
           <a:p>
             <a:pPr marL="749808" lvl="1" indent="-457200"/>
             <a:r>
               <a:rPr lang="en-US" dirty="0" smtClean="0"/>
-              <a:t>Directly from </a:t>
-            </a:r>
-            <a:r>
-              <a:rPr lang="en-US" dirty="0" smtClean="0"/>
-              <a:t>images using linear feature extraction</a:t>
-            </a:r>
-            <a:endParaRPr lang="en-US" dirty="0" smtClean="0"/>
-          </a:p>
-          <a:p>
-            <a:pPr marL="749808" lvl="1" indent="-457200"/>
-            <a:r>
-              <a:rPr lang="en-US" dirty="0" smtClean="0"/>
-              <a:t>Indirectly, by converting the </a:t>
-            </a:r>
-            <a:r>
-              <a:rPr lang="en-US" dirty="0" smtClean="0"/>
-              <a:t>graph to pixel intensity data, then </a:t>
-            </a:r>
-            <a:r>
-              <a:rPr lang="en-US" dirty="0" smtClean="0"/>
-              <a:t>unrolling </a:t>
-            </a:r>
-            <a:r>
-              <a:rPr lang="en-US" dirty="0" smtClean="0"/>
-              <a:t>the pixel data </a:t>
-            </a:r>
-            <a:r>
-              <a:rPr lang="en-US" dirty="0" smtClean="0"/>
-              <a:t>matrix into a </a:t>
-            </a:r>
-            <a:r>
-              <a:rPr lang="en-US" dirty="0" smtClean="0"/>
-              <a:t>vector 1000s </a:t>
-            </a:r>
-            <a:r>
-              <a:rPr lang="en-US" dirty="0" smtClean="0"/>
-              <a:t>of new features for each observation, “generated” from the underlying </a:t>
-            </a:r>
-            <a:r>
-              <a:rPr lang="en-US" dirty="0" smtClean="0"/>
-              <a:t>price data</a:t>
-            </a:r>
-            <a:endParaRPr lang="en-US" dirty="0" smtClean="0"/>
+              <a:t>Indirectly, by converting the graph to pixel intensity data, then unrolling the pixel data matrix into a vector 1000s of new features for each observation, “generated” from the underlying price data</a:t>
+            </a:r>
           </a:p>
           <a:p>
             <a:pPr marL="457200" indent="-457200">
@@ -4462,11 +4391,7 @@
           <a:p>
             <a:r>
               <a:rPr lang="en-US" dirty="0" smtClean="0"/>
-              <a:t>Modeling Approach</a:t>
-            </a:r>
-            <a:r>
-              <a:rPr lang="en-US" dirty="0" smtClean="0"/>
-              <a:t>, continued</a:t>
+              <a:t>Modeling Approach, continued</a:t>
             </a:r>
             <a:endParaRPr lang="en-US" dirty="0"/>
           </a:p>
@@ -4960,24 +4885,14 @@
           <a:p>
             <a:r>
               <a:rPr lang="en-US" dirty="0" smtClean="0"/>
-              <a:t>Having patience while trying to train models on massive datasets (~ 6,000 x 30,000 </a:t>
-            </a:r>
+              <a:t>Having patience while trying to train models on massive datasets (~ 6,000 x 30,000 matrix of raw pixel data)</a:t>
+            </a:r>
+          </a:p>
+          <a:p>
             <a:r>
               <a:rPr lang="en-US" dirty="0" smtClean="0"/>
-              <a:t>matrix of raw pixel data)</a:t>
-            </a:r>
-            <a:endParaRPr lang="en-US" dirty="0" smtClean="0"/>
-          </a:p>
-          <a:p>
-            <a:r>
-              <a:rPr lang="en-US" dirty="0" smtClean="0"/>
-              <a:t>Not being able to use regular TTS / </a:t>
-            </a:r>
-            <a:r>
-              <a:rPr lang="en-US" dirty="0" smtClean="0"/>
-              <a:t>Cross-Validation due to time series data</a:t>
-            </a:r>
-            <a:endParaRPr lang="en-US" dirty="0" smtClean="0"/>
+              <a:t>Not being able to use regular TTS / Cross-Validation due to time series data</a:t>
+            </a:r>
           </a:p>
           <a:p>
             <a:r>
@@ -5115,7 +5030,7 @@
         </p:spPr>
         <p:txBody>
           <a:bodyPr>
-            <a:normAutofit/>
+            <a:normAutofit fontScale="92500"/>
           </a:bodyPr>
           <a:lstStyle/>
           <a:p>
@@ -5127,22 +5042,35 @@
           <a:p>
             <a:r>
               <a:rPr lang="en-US" dirty="0" smtClean="0"/>
-              <a:t>Models varied in performance over these </a:t>
-            </a:r>
+              <a:t>Models varied in performance over these data; high end performance was impressive</a:t>
+            </a:r>
+          </a:p>
+          <a:p>
             <a:r>
               <a:rPr lang="en-US" dirty="0" smtClean="0"/>
-              <a:t>data; high </a:t>
+              <a:t>CV-based extracted features also performed </a:t>
             </a:r>
             <a:r>
               <a:rPr lang="en-US" dirty="0" smtClean="0"/>
-              <a:t>end performance was impressive</a:t>
-            </a:r>
-          </a:p>
-          <a:p>
+              <a:t>quite well (better than </a:t>
+            </a:r>
+            <a:r>
+              <a:rPr lang="en-US" smtClean="0"/>
+              <a:t>comparable base </a:t>
+            </a:r>
             <a:r>
               <a:rPr lang="en-US" dirty="0" smtClean="0"/>
-              <a:t>CV-based extracted features also performed fairly well (for one target case only)</a:t>
-            </a:r>
+              <a:t>models for </a:t>
+            </a:r>
+            <a:r>
+              <a:rPr lang="en-US" smtClean="0"/>
+              <a:t>target of </a:t>
+            </a:r>
+            <a:r>
+              <a:rPr lang="en-US" dirty="0" smtClean="0"/>
+              <a:t>5 minutes)</a:t>
+            </a:r>
+            <a:endParaRPr lang="en-US" dirty="0" smtClean="0"/>
           </a:p>
           <a:p>
             <a:r>
@@ -5162,7 +5090,7 @@
           <p:nvPr>
             <p:extLst>
               <p:ext uri="{D42A27DB-BD31-4B8C-83A1-F6EECF244321}">
-                <p14:modId xmlns:p14="http://schemas.microsoft.com/office/powerpoint/2010/main" val="3750969376"/>
+                <p14:modId xmlns:p14="http://schemas.microsoft.com/office/powerpoint/2010/main" val="2141291141"/>
               </p:ext>
             </p:extLst>
           </p:nvPr>
@@ -5853,7 +5781,15 @@
                             <a:srgbClr val="0070C0"/>
                           </a:solidFill>
                         </a:rPr>
-                        <a:t> min, up</a:t>
+                        <a:t> </a:t>
+                      </a:r>
+                      <a:r>
+                        <a:rPr lang="en-US" baseline="0" dirty="0" smtClean="0">
+                          <a:solidFill>
+                            <a:srgbClr val="0070C0"/>
+                          </a:solidFill>
+                        </a:rPr>
+                        <a:t>min</a:t>
                       </a:r>
                       <a:endParaRPr lang="en-US" dirty="0">
                         <a:solidFill>
@@ -5965,7 +5901,15 @@
                             <a:srgbClr val="0070C0"/>
                           </a:solidFill>
                         </a:rPr>
-                        <a:t>5 min, up</a:t>
+                        <a:t>5 </a:t>
+                      </a:r>
+                      <a:r>
+                        <a:rPr lang="en-US" dirty="0" smtClean="0">
+                          <a:solidFill>
+                            <a:srgbClr val="0070C0"/>
+                          </a:solidFill>
+                        </a:rPr>
+                        <a:t>min</a:t>
                       </a:r>
                       <a:endParaRPr lang="en-US" dirty="0">
                         <a:solidFill>
@@ -6158,21 +6102,8 @@
           <a:p>
             <a:r>
               <a:rPr lang="en-US" dirty="0" smtClean="0"/>
-              <a:t>Additional time-series </a:t>
-            </a:r>
-            <a:r>
-              <a:rPr lang="en-US" dirty="0" smtClean="0"/>
-              <a:t>features, e.g. weighted </a:t>
-            </a:r>
-            <a:r>
-              <a:rPr lang="en-US" dirty="0" smtClean="0"/>
-              <a:t>trailing feature stats baked into current </a:t>
-            </a:r>
-            <a:r>
-              <a:rPr lang="en-US" dirty="0" smtClean="0"/>
-              <a:t>observation</a:t>
-            </a:r>
-            <a:endParaRPr lang="en-US" dirty="0" smtClean="0"/>
+              <a:t>Additional time-series features, e.g. weighted trailing feature stats baked into current observation</a:t>
+            </a:r>
           </a:p>
           <a:p>
             <a:r>
@@ -6191,19 +6122,7 @@
             </a:r>
             <a:r>
               <a:rPr lang="en-US" dirty="0" smtClean="0"/>
-              <a:t>” </a:t>
-            </a:r>
-            <a:r>
-              <a:rPr lang="en-US" dirty="0" smtClean="0"/>
-              <a:t>of analytic processes </a:t>
-            </a:r>
-            <a:r>
-              <a:rPr lang="en-US" dirty="0" smtClean="0"/>
-              <a:t>as </a:t>
-            </a:r>
-            <a:r>
-              <a:rPr lang="en-US" dirty="0" smtClean="0"/>
-              <a:t>Python is very nice for this sort of thing:</a:t>
+              <a:t>” of analytic processes as Python is very nice for this sort of thing:</a:t>
             </a:r>
           </a:p>
           <a:p>

</xml_diff>